<commit_message>
Drobne poprawki i pomysły
</commit_message>
<xml_diff>
--- a/Wprowadzenie do funkcji/IV. Wprowadzenie do funkcji/NWW i NWD.pptx
+++ b/Wprowadzenie do funkcji/IV. Wprowadzenie do funkcji/NWW i NWD.pptx
@@ -8,13 +8,13 @@
     <p:sldId id="256" r:id="rId2"/>
     <p:sldId id="266" r:id="rId3"/>
     <p:sldId id="267" r:id="rId4"/>
-    <p:sldId id="268" r:id="rId5"/>
+    <p:sldId id="276" r:id="rId5"/>
     <p:sldId id="274" r:id="rId6"/>
     <p:sldId id="265" r:id="rId7"/>
     <p:sldId id="270" r:id="rId8"/>
     <p:sldId id="271" r:id="rId9"/>
     <p:sldId id="272" r:id="rId10"/>
-    <p:sldId id="273" r:id="rId11"/>
+    <p:sldId id="277" r:id="rId11"/>
     <p:sldId id="269" r:id="rId12"/>
   </p:sldIdLst>
   <p:sldSz cx="12192000" cy="6858000"/>
@@ -116,7 +116,7 @@
   </p:defaultTextStyle>
   <p:extLst>
     <p:ext uri="{EFAFB233-063F-42B5-8137-9DF3F51BA10A}">
-      <p15:sldGuideLst xmlns:p15="http://schemas.microsoft.com/office/powerpoint/2012/main" xmlns="">
+      <p15:sldGuideLst xmlns:p15="http://schemas.microsoft.com/office/powerpoint/2012/main">
         <p15:guide id="1" orient="horz" pos="2160">
           <p15:clr>
             <a:srgbClr val="A4A3A4"/>
@@ -155,7 +155,7 @@
           <p:cNvPr id="2" name="Tytuł 1">
             <a:extLst>
               <a:ext uri="{FF2B5EF4-FFF2-40B4-BE49-F238E27FC236}">
-                <a16:creationId xmlns:a16="http://schemas.microsoft.com/office/drawing/2014/main" xmlns="" id="{2E906DA8-031B-46AE-B843-484AE5D61254}"/>
+                <a16:creationId xmlns:a16="http://schemas.microsoft.com/office/drawing/2014/main" id="{2E906DA8-031B-46AE-B843-484AE5D61254}"/>
               </a:ext>
             </a:extLst>
           </p:cNvPr>
@@ -192,7 +192,7 @@
           <p:cNvPr id="3" name="Podtytuł 2">
             <a:extLst>
               <a:ext uri="{FF2B5EF4-FFF2-40B4-BE49-F238E27FC236}">
-                <a16:creationId xmlns:a16="http://schemas.microsoft.com/office/drawing/2014/main" xmlns="" id="{D2740A6F-DA11-435C-B898-4DAF922F5A4B}"/>
+                <a16:creationId xmlns:a16="http://schemas.microsoft.com/office/drawing/2014/main" id="{D2740A6F-DA11-435C-B898-4DAF922F5A4B}"/>
               </a:ext>
             </a:extLst>
           </p:cNvPr>
@@ -262,7 +262,7 @@
           <p:cNvPr id="4" name="Symbol zastępczy daty 3">
             <a:extLst>
               <a:ext uri="{FF2B5EF4-FFF2-40B4-BE49-F238E27FC236}">
-                <a16:creationId xmlns:a16="http://schemas.microsoft.com/office/drawing/2014/main" xmlns="" id="{29127C2D-10EB-4C2B-9050-E881EE2537B6}"/>
+                <a16:creationId xmlns:a16="http://schemas.microsoft.com/office/drawing/2014/main" id="{29127C2D-10EB-4C2B-9050-E881EE2537B6}"/>
               </a:ext>
             </a:extLst>
           </p:cNvPr>
@@ -281,7 +281,7 @@
             <a:fld id="{48C97C24-B5A0-4EEB-AF04-DC997EDCD259}" type="datetimeFigureOut">
               <a:rPr lang="pl-PL" smtClean="0"/>
               <a:pPr/>
-              <a:t>2018-02-28</a:t>
+              <a:t>15.11.2019</a:t>
             </a:fld>
             <a:endParaRPr lang="pl-PL"/>
           </a:p>
@@ -292,7 +292,7 @@
           <p:cNvPr id="5" name="Symbol zastępczy stopki 4">
             <a:extLst>
               <a:ext uri="{FF2B5EF4-FFF2-40B4-BE49-F238E27FC236}">
-                <a16:creationId xmlns:a16="http://schemas.microsoft.com/office/drawing/2014/main" xmlns="" id="{061BE54C-48E3-4FFC-8012-79218FE52203}"/>
+                <a16:creationId xmlns:a16="http://schemas.microsoft.com/office/drawing/2014/main" id="{061BE54C-48E3-4FFC-8012-79218FE52203}"/>
               </a:ext>
             </a:extLst>
           </p:cNvPr>
@@ -317,7 +317,7 @@
           <p:cNvPr id="6" name="Symbol zastępczy numeru slajdu 5">
             <a:extLst>
               <a:ext uri="{FF2B5EF4-FFF2-40B4-BE49-F238E27FC236}">
-                <a16:creationId xmlns:a16="http://schemas.microsoft.com/office/drawing/2014/main" xmlns="" id="{8949C2E3-99EA-4BD7-9BFD-85C171B79F4E}"/>
+                <a16:creationId xmlns:a16="http://schemas.microsoft.com/office/drawing/2014/main" id="{8949C2E3-99EA-4BD7-9BFD-85C171B79F4E}"/>
               </a:ext>
             </a:extLst>
           </p:cNvPr>
@@ -345,7 +345,7 @@
     </p:spTree>
     <p:extLst>
       <p:ext uri="{BB962C8B-B14F-4D97-AF65-F5344CB8AC3E}">
-        <p14:creationId xmlns:p14="http://schemas.microsoft.com/office/powerpoint/2010/main" xmlns="" val="4212796716"/>
+        <p14:creationId xmlns:p14="http://schemas.microsoft.com/office/powerpoint/2010/main" val="4212796716"/>
       </p:ext>
     </p:extLst>
   </p:cSld>
@@ -377,7 +377,7 @@
           <p:cNvPr id="2" name="Tytuł 1">
             <a:extLst>
               <a:ext uri="{FF2B5EF4-FFF2-40B4-BE49-F238E27FC236}">
-                <a16:creationId xmlns:a16="http://schemas.microsoft.com/office/drawing/2014/main" xmlns="" id="{A1B0A203-F969-428C-A918-33334A69CE28}"/>
+                <a16:creationId xmlns:a16="http://schemas.microsoft.com/office/drawing/2014/main" id="{A1B0A203-F969-428C-A918-33334A69CE28}"/>
               </a:ext>
             </a:extLst>
           </p:cNvPr>
@@ -405,7 +405,7 @@
           <p:cNvPr id="3" name="Symbol zastępczy tytułu pionowego 2">
             <a:extLst>
               <a:ext uri="{FF2B5EF4-FFF2-40B4-BE49-F238E27FC236}">
-                <a16:creationId xmlns:a16="http://schemas.microsoft.com/office/drawing/2014/main" xmlns="" id="{E624B7EE-832B-406D-93F7-F0F580C8D08A}"/>
+                <a16:creationId xmlns:a16="http://schemas.microsoft.com/office/drawing/2014/main" id="{E624B7EE-832B-406D-93F7-F0F580C8D08A}"/>
               </a:ext>
             </a:extLst>
           </p:cNvPr>
@@ -462,7 +462,7 @@
           <p:cNvPr id="4" name="Symbol zastępczy daty 3">
             <a:extLst>
               <a:ext uri="{FF2B5EF4-FFF2-40B4-BE49-F238E27FC236}">
-                <a16:creationId xmlns:a16="http://schemas.microsoft.com/office/drawing/2014/main" xmlns="" id="{C8E8919D-C2A9-4E58-8DCD-E0821FC315CC}"/>
+                <a16:creationId xmlns:a16="http://schemas.microsoft.com/office/drawing/2014/main" id="{C8E8919D-C2A9-4E58-8DCD-E0821FC315CC}"/>
               </a:ext>
             </a:extLst>
           </p:cNvPr>
@@ -481,7 +481,7 @@
             <a:fld id="{48C97C24-B5A0-4EEB-AF04-DC997EDCD259}" type="datetimeFigureOut">
               <a:rPr lang="pl-PL" smtClean="0"/>
               <a:pPr/>
-              <a:t>2018-02-28</a:t>
+              <a:t>15.11.2019</a:t>
             </a:fld>
             <a:endParaRPr lang="pl-PL"/>
           </a:p>
@@ -492,7 +492,7 @@
           <p:cNvPr id="5" name="Symbol zastępczy stopki 4">
             <a:extLst>
               <a:ext uri="{FF2B5EF4-FFF2-40B4-BE49-F238E27FC236}">
-                <a16:creationId xmlns:a16="http://schemas.microsoft.com/office/drawing/2014/main" xmlns="" id="{4A646B4C-FF38-4838-ADCE-81E6A24FE95C}"/>
+                <a16:creationId xmlns:a16="http://schemas.microsoft.com/office/drawing/2014/main" id="{4A646B4C-FF38-4838-ADCE-81E6A24FE95C}"/>
               </a:ext>
             </a:extLst>
           </p:cNvPr>
@@ -517,7 +517,7 @@
           <p:cNvPr id="6" name="Symbol zastępczy numeru slajdu 5">
             <a:extLst>
               <a:ext uri="{FF2B5EF4-FFF2-40B4-BE49-F238E27FC236}">
-                <a16:creationId xmlns:a16="http://schemas.microsoft.com/office/drawing/2014/main" xmlns="" id="{5E61B2E4-B7A0-4BE5-A540-0C45E0DDCE44}"/>
+                <a16:creationId xmlns:a16="http://schemas.microsoft.com/office/drawing/2014/main" id="{5E61B2E4-B7A0-4BE5-A540-0C45E0DDCE44}"/>
               </a:ext>
             </a:extLst>
           </p:cNvPr>
@@ -545,7 +545,7 @@
     </p:spTree>
     <p:extLst>
       <p:ext uri="{BB962C8B-B14F-4D97-AF65-F5344CB8AC3E}">
-        <p14:creationId xmlns:p14="http://schemas.microsoft.com/office/powerpoint/2010/main" xmlns="" val="2713182373"/>
+        <p14:creationId xmlns:p14="http://schemas.microsoft.com/office/powerpoint/2010/main" val="2713182373"/>
       </p:ext>
     </p:extLst>
   </p:cSld>
@@ -577,7 +577,7 @@
           <p:cNvPr id="2" name="Tytuł pionowy 1">
             <a:extLst>
               <a:ext uri="{FF2B5EF4-FFF2-40B4-BE49-F238E27FC236}">
-                <a16:creationId xmlns:a16="http://schemas.microsoft.com/office/drawing/2014/main" xmlns="" id="{9CCFA88A-8015-4B34-A738-C3E96ADAE033}"/>
+                <a16:creationId xmlns:a16="http://schemas.microsoft.com/office/drawing/2014/main" id="{9CCFA88A-8015-4B34-A738-C3E96ADAE033}"/>
               </a:ext>
             </a:extLst>
           </p:cNvPr>
@@ -610,7 +610,7 @@
           <p:cNvPr id="3" name="Symbol zastępczy tytułu pionowego 2">
             <a:extLst>
               <a:ext uri="{FF2B5EF4-FFF2-40B4-BE49-F238E27FC236}">
-                <a16:creationId xmlns:a16="http://schemas.microsoft.com/office/drawing/2014/main" xmlns="" id="{F1A78665-1F94-4F7B-B205-5A481C14E76A}"/>
+                <a16:creationId xmlns:a16="http://schemas.microsoft.com/office/drawing/2014/main" id="{F1A78665-1F94-4F7B-B205-5A481C14E76A}"/>
               </a:ext>
             </a:extLst>
           </p:cNvPr>
@@ -672,7 +672,7 @@
           <p:cNvPr id="4" name="Symbol zastępczy daty 3">
             <a:extLst>
               <a:ext uri="{FF2B5EF4-FFF2-40B4-BE49-F238E27FC236}">
-                <a16:creationId xmlns:a16="http://schemas.microsoft.com/office/drawing/2014/main" xmlns="" id="{47D36C25-B813-4849-A544-1D949A3BE900}"/>
+                <a16:creationId xmlns:a16="http://schemas.microsoft.com/office/drawing/2014/main" id="{47D36C25-B813-4849-A544-1D949A3BE900}"/>
               </a:ext>
             </a:extLst>
           </p:cNvPr>
@@ -691,7 +691,7 @@
             <a:fld id="{48C97C24-B5A0-4EEB-AF04-DC997EDCD259}" type="datetimeFigureOut">
               <a:rPr lang="pl-PL" smtClean="0"/>
               <a:pPr/>
-              <a:t>2018-02-28</a:t>
+              <a:t>15.11.2019</a:t>
             </a:fld>
             <a:endParaRPr lang="pl-PL"/>
           </a:p>
@@ -702,7 +702,7 @@
           <p:cNvPr id="5" name="Symbol zastępczy stopki 4">
             <a:extLst>
               <a:ext uri="{FF2B5EF4-FFF2-40B4-BE49-F238E27FC236}">
-                <a16:creationId xmlns:a16="http://schemas.microsoft.com/office/drawing/2014/main" xmlns="" id="{2B8DDED9-97C6-45C6-A967-C459C82E3411}"/>
+                <a16:creationId xmlns:a16="http://schemas.microsoft.com/office/drawing/2014/main" id="{2B8DDED9-97C6-45C6-A967-C459C82E3411}"/>
               </a:ext>
             </a:extLst>
           </p:cNvPr>
@@ -727,7 +727,7 @@
           <p:cNvPr id="6" name="Symbol zastępczy numeru slajdu 5">
             <a:extLst>
               <a:ext uri="{FF2B5EF4-FFF2-40B4-BE49-F238E27FC236}">
-                <a16:creationId xmlns:a16="http://schemas.microsoft.com/office/drawing/2014/main" xmlns="" id="{EB84A4D4-0E1B-43DE-8E63-D01F41F965D0}"/>
+                <a16:creationId xmlns:a16="http://schemas.microsoft.com/office/drawing/2014/main" id="{EB84A4D4-0E1B-43DE-8E63-D01F41F965D0}"/>
               </a:ext>
             </a:extLst>
           </p:cNvPr>
@@ -755,7 +755,7 @@
     </p:spTree>
     <p:extLst>
       <p:ext uri="{BB962C8B-B14F-4D97-AF65-F5344CB8AC3E}">
-        <p14:creationId xmlns:p14="http://schemas.microsoft.com/office/powerpoint/2010/main" xmlns="" val="3805513044"/>
+        <p14:creationId xmlns:p14="http://schemas.microsoft.com/office/powerpoint/2010/main" val="3805513044"/>
       </p:ext>
     </p:extLst>
   </p:cSld>
@@ -787,7 +787,7 @@
           <p:cNvPr id="2" name="Tytuł 1">
             <a:extLst>
               <a:ext uri="{FF2B5EF4-FFF2-40B4-BE49-F238E27FC236}">
-                <a16:creationId xmlns:a16="http://schemas.microsoft.com/office/drawing/2014/main" xmlns="" id="{1A7DE3D8-E9C7-4F7C-87FC-6F53A3FB2876}"/>
+                <a16:creationId xmlns:a16="http://schemas.microsoft.com/office/drawing/2014/main" id="{1A7DE3D8-E9C7-4F7C-87FC-6F53A3FB2876}"/>
               </a:ext>
             </a:extLst>
           </p:cNvPr>
@@ -815,7 +815,7 @@
           <p:cNvPr id="3" name="Symbol zastępczy zawartości 2">
             <a:extLst>
               <a:ext uri="{FF2B5EF4-FFF2-40B4-BE49-F238E27FC236}">
-                <a16:creationId xmlns:a16="http://schemas.microsoft.com/office/drawing/2014/main" xmlns="" id="{F64567C1-BA14-41C8-A2A2-0E1C01E55E5C}"/>
+                <a16:creationId xmlns:a16="http://schemas.microsoft.com/office/drawing/2014/main" id="{F64567C1-BA14-41C8-A2A2-0E1C01E55E5C}"/>
               </a:ext>
             </a:extLst>
           </p:cNvPr>
@@ -872,7 +872,7 @@
           <p:cNvPr id="4" name="Symbol zastępczy daty 3">
             <a:extLst>
               <a:ext uri="{FF2B5EF4-FFF2-40B4-BE49-F238E27FC236}">
-                <a16:creationId xmlns:a16="http://schemas.microsoft.com/office/drawing/2014/main" xmlns="" id="{8FFAE89C-9A86-4BD8-A615-F28629E9A197}"/>
+                <a16:creationId xmlns:a16="http://schemas.microsoft.com/office/drawing/2014/main" id="{8FFAE89C-9A86-4BD8-A615-F28629E9A197}"/>
               </a:ext>
             </a:extLst>
           </p:cNvPr>
@@ -891,7 +891,7 @@
             <a:fld id="{48C97C24-B5A0-4EEB-AF04-DC997EDCD259}" type="datetimeFigureOut">
               <a:rPr lang="pl-PL" smtClean="0"/>
               <a:pPr/>
-              <a:t>2018-02-28</a:t>
+              <a:t>15.11.2019</a:t>
             </a:fld>
             <a:endParaRPr lang="pl-PL"/>
           </a:p>
@@ -902,7 +902,7 @@
           <p:cNvPr id="5" name="Symbol zastępczy stopki 4">
             <a:extLst>
               <a:ext uri="{FF2B5EF4-FFF2-40B4-BE49-F238E27FC236}">
-                <a16:creationId xmlns:a16="http://schemas.microsoft.com/office/drawing/2014/main" xmlns="" id="{0C6BCA18-063B-44E1-B696-0EA00E5F14C8}"/>
+                <a16:creationId xmlns:a16="http://schemas.microsoft.com/office/drawing/2014/main" id="{0C6BCA18-063B-44E1-B696-0EA00E5F14C8}"/>
               </a:ext>
             </a:extLst>
           </p:cNvPr>
@@ -927,7 +927,7 @@
           <p:cNvPr id="6" name="Symbol zastępczy numeru slajdu 5">
             <a:extLst>
               <a:ext uri="{FF2B5EF4-FFF2-40B4-BE49-F238E27FC236}">
-                <a16:creationId xmlns:a16="http://schemas.microsoft.com/office/drawing/2014/main" xmlns="" id="{6FDB8C17-93CF-4CC2-9DA2-615CE6F17751}"/>
+                <a16:creationId xmlns:a16="http://schemas.microsoft.com/office/drawing/2014/main" id="{6FDB8C17-93CF-4CC2-9DA2-615CE6F17751}"/>
               </a:ext>
             </a:extLst>
           </p:cNvPr>
@@ -955,7 +955,7 @@
     </p:spTree>
     <p:extLst>
       <p:ext uri="{BB962C8B-B14F-4D97-AF65-F5344CB8AC3E}">
-        <p14:creationId xmlns:p14="http://schemas.microsoft.com/office/powerpoint/2010/main" xmlns="" val="2216129012"/>
+        <p14:creationId xmlns:p14="http://schemas.microsoft.com/office/powerpoint/2010/main" val="2216129012"/>
       </p:ext>
     </p:extLst>
   </p:cSld>
@@ -987,7 +987,7 @@
           <p:cNvPr id="2" name="Tytuł 1">
             <a:extLst>
               <a:ext uri="{FF2B5EF4-FFF2-40B4-BE49-F238E27FC236}">
-                <a16:creationId xmlns:a16="http://schemas.microsoft.com/office/drawing/2014/main" xmlns="" id="{4E942EFE-4EF9-4637-9BC7-0E89CD2CF11F}"/>
+                <a16:creationId xmlns:a16="http://schemas.microsoft.com/office/drawing/2014/main" id="{4E942EFE-4EF9-4637-9BC7-0E89CD2CF11F}"/>
               </a:ext>
             </a:extLst>
           </p:cNvPr>
@@ -1024,7 +1024,7 @@
           <p:cNvPr id="3" name="Symbol zastępczy tekstu 2">
             <a:extLst>
               <a:ext uri="{FF2B5EF4-FFF2-40B4-BE49-F238E27FC236}">
-                <a16:creationId xmlns:a16="http://schemas.microsoft.com/office/drawing/2014/main" xmlns="" id="{2686B184-120D-4FEF-B2A9-9B6BF4D46B5E}"/>
+                <a16:creationId xmlns:a16="http://schemas.microsoft.com/office/drawing/2014/main" id="{2686B184-120D-4FEF-B2A9-9B6BF4D46B5E}"/>
               </a:ext>
             </a:extLst>
           </p:cNvPr>
@@ -1149,7 +1149,7 @@
           <p:cNvPr id="4" name="Symbol zastępczy daty 3">
             <a:extLst>
               <a:ext uri="{FF2B5EF4-FFF2-40B4-BE49-F238E27FC236}">
-                <a16:creationId xmlns:a16="http://schemas.microsoft.com/office/drawing/2014/main" xmlns="" id="{F3A43BE0-CA28-4F54-BFDD-0C5E08BB6B52}"/>
+                <a16:creationId xmlns:a16="http://schemas.microsoft.com/office/drawing/2014/main" id="{F3A43BE0-CA28-4F54-BFDD-0C5E08BB6B52}"/>
               </a:ext>
             </a:extLst>
           </p:cNvPr>
@@ -1168,7 +1168,7 @@
             <a:fld id="{48C97C24-B5A0-4EEB-AF04-DC997EDCD259}" type="datetimeFigureOut">
               <a:rPr lang="pl-PL" smtClean="0"/>
               <a:pPr/>
-              <a:t>2018-02-28</a:t>
+              <a:t>15.11.2019</a:t>
             </a:fld>
             <a:endParaRPr lang="pl-PL"/>
           </a:p>
@@ -1179,7 +1179,7 @@
           <p:cNvPr id="5" name="Symbol zastępczy stopki 4">
             <a:extLst>
               <a:ext uri="{FF2B5EF4-FFF2-40B4-BE49-F238E27FC236}">
-                <a16:creationId xmlns:a16="http://schemas.microsoft.com/office/drawing/2014/main" xmlns="" id="{1A16594D-B3E4-42E3-98C8-AD39E06F465B}"/>
+                <a16:creationId xmlns:a16="http://schemas.microsoft.com/office/drawing/2014/main" id="{1A16594D-B3E4-42E3-98C8-AD39E06F465B}"/>
               </a:ext>
             </a:extLst>
           </p:cNvPr>
@@ -1204,7 +1204,7 @@
           <p:cNvPr id="6" name="Symbol zastępczy numeru slajdu 5">
             <a:extLst>
               <a:ext uri="{FF2B5EF4-FFF2-40B4-BE49-F238E27FC236}">
-                <a16:creationId xmlns:a16="http://schemas.microsoft.com/office/drawing/2014/main" xmlns="" id="{32C13F70-E20C-44C5-9E8B-2C4DFDEAB06E}"/>
+                <a16:creationId xmlns:a16="http://schemas.microsoft.com/office/drawing/2014/main" id="{32C13F70-E20C-44C5-9E8B-2C4DFDEAB06E}"/>
               </a:ext>
             </a:extLst>
           </p:cNvPr>
@@ -1232,7 +1232,7 @@
     </p:spTree>
     <p:extLst>
       <p:ext uri="{BB962C8B-B14F-4D97-AF65-F5344CB8AC3E}">
-        <p14:creationId xmlns:p14="http://schemas.microsoft.com/office/powerpoint/2010/main" xmlns="" val="1346549909"/>
+        <p14:creationId xmlns:p14="http://schemas.microsoft.com/office/powerpoint/2010/main" val="1346549909"/>
       </p:ext>
     </p:extLst>
   </p:cSld>
@@ -1264,7 +1264,7 @@
           <p:cNvPr id="2" name="Tytuł 1">
             <a:extLst>
               <a:ext uri="{FF2B5EF4-FFF2-40B4-BE49-F238E27FC236}">
-                <a16:creationId xmlns:a16="http://schemas.microsoft.com/office/drawing/2014/main" xmlns="" id="{963CE8FF-BAF0-4D75-80EA-9132B058B99D}"/>
+                <a16:creationId xmlns:a16="http://schemas.microsoft.com/office/drawing/2014/main" id="{963CE8FF-BAF0-4D75-80EA-9132B058B99D}"/>
               </a:ext>
             </a:extLst>
           </p:cNvPr>
@@ -1292,7 +1292,7 @@
           <p:cNvPr id="3" name="Symbol zastępczy zawartości 2">
             <a:extLst>
               <a:ext uri="{FF2B5EF4-FFF2-40B4-BE49-F238E27FC236}">
-                <a16:creationId xmlns:a16="http://schemas.microsoft.com/office/drawing/2014/main" xmlns="" id="{4D9CE0DD-F43F-4178-A577-B670A69183B0}"/>
+                <a16:creationId xmlns:a16="http://schemas.microsoft.com/office/drawing/2014/main" id="{4D9CE0DD-F43F-4178-A577-B670A69183B0}"/>
               </a:ext>
             </a:extLst>
           </p:cNvPr>
@@ -1354,7 +1354,7 @@
           <p:cNvPr id="4" name="Symbol zastępczy zawartości 3">
             <a:extLst>
               <a:ext uri="{FF2B5EF4-FFF2-40B4-BE49-F238E27FC236}">
-                <a16:creationId xmlns:a16="http://schemas.microsoft.com/office/drawing/2014/main" xmlns="" id="{2CAB016F-A739-4D6A-B898-0A9B884379B2}"/>
+                <a16:creationId xmlns:a16="http://schemas.microsoft.com/office/drawing/2014/main" id="{2CAB016F-A739-4D6A-B898-0A9B884379B2}"/>
               </a:ext>
             </a:extLst>
           </p:cNvPr>
@@ -1416,7 +1416,7 @@
           <p:cNvPr id="5" name="Symbol zastępczy daty 4">
             <a:extLst>
               <a:ext uri="{FF2B5EF4-FFF2-40B4-BE49-F238E27FC236}">
-                <a16:creationId xmlns:a16="http://schemas.microsoft.com/office/drawing/2014/main" xmlns="" id="{1C8F018D-96DA-4BA5-9981-96420A250C68}"/>
+                <a16:creationId xmlns:a16="http://schemas.microsoft.com/office/drawing/2014/main" id="{1C8F018D-96DA-4BA5-9981-96420A250C68}"/>
               </a:ext>
             </a:extLst>
           </p:cNvPr>
@@ -1435,7 +1435,7 @@
             <a:fld id="{48C97C24-B5A0-4EEB-AF04-DC997EDCD259}" type="datetimeFigureOut">
               <a:rPr lang="pl-PL" smtClean="0"/>
               <a:pPr/>
-              <a:t>2018-02-28</a:t>
+              <a:t>15.11.2019</a:t>
             </a:fld>
             <a:endParaRPr lang="pl-PL"/>
           </a:p>
@@ -1446,7 +1446,7 @@
           <p:cNvPr id="6" name="Symbol zastępczy stopki 5">
             <a:extLst>
               <a:ext uri="{FF2B5EF4-FFF2-40B4-BE49-F238E27FC236}">
-                <a16:creationId xmlns:a16="http://schemas.microsoft.com/office/drawing/2014/main" xmlns="" id="{9F9416CE-D2CC-4914-A261-B63C236C657A}"/>
+                <a16:creationId xmlns:a16="http://schemas.microsoft.com/office/drawing/2014/main" id="{9F9416CE-D2CC-4914-A261-B63C236C657A}"/>
               </a:ext>
             </a:extLst>
           </p:cNvPr>
@@ -1471,7 +1471,7 @@
           <p:cNvPr id="7" name="Symbol zastępczy numeru slajdu 6">
             <a:extLst>
               <a:ext uri="{FF2B5EF4-FFF2-40B4-BE49-F238E27FC236}">
-                <a16:creationId xmlns:a16="http://schemas.microsoft.com/office/drawing/2014/main" xmlns="" id="{D5286156-C8A2-4E6B-878B-DF2F7EBBA5FB}"/>
+                <a16:creationId xmlns:a16="http://schemas.microsoft.com/office/drawing/2014/main" id="{D5286156-C8A2-4E6B-878B-DF2F7EBBA5FB}"/>
               </a:ext>
             </a:extLst>
           </p:cNvPr>
@@ -1499,7 +1499,7 @@
     </p:spTree>
     <p:extLst>
       <p:ext uri="{BB962C8B-B14F-4D97-AF65-F5344CB8AC3E}">
-        <p14:creationId xmlns:p14="http://schemas.microsoft.com/office/powerpoint/2010/main" xmlns="" val="2703309056"/>
+        <p14:creationId xmlns:p14="http://schemas.microsoft.com/office/powerpoint/2010/main" val="2703309056"/>
       </p:ext>
     </p:extLst>
   </p:cSld>
@@ -1531,7 +1531,7 @@
           <p:cNvPr id="2" name="Tytuł 1">
             <a:extLst>
               <a:ext uri="{FF2B5EF4-FFF2-40B4-BE49-F238E27FC236}">
-                <a16:creationId xmlns:a16="http://schemas.microsoft.com/office/drawing/2014/main" xmlns="" id="{3EE273E5-A330-4F9B-8638-EF6416616BDC}"/>
+                <a16:creationId xmlns:a16="http://schemas.microsoft.com/office/drawing/2014/main" id="{3EE273E5-A330-4F9B-8638-EF6416616BDC}"/>
               </a:ext>
             </a:extLst>
           </p:cNvPr>
@@ -1564,7 +1564,7 @@
           <p:cNvPr id="3" name="Symbol zastępczy tekstu 2">
             <a:extLst>
               <a:ext uri="{FF2B5EF4-FFF2-40B4-BE49-F238E27FC236}">
-                <a16:creationId xmlns:a16="http://schemas.microsoft.com/office/drawing/2014/main" xmlns="" id="{96649784-1CFD-4104-909F-40D92F2BA168}"/>
+                <a16:creationId xmlns:a16="http://schemas.microsoft.com/office/drawing/2014/main" id="{96649784-1CFD-4104-909F-40D92F2BA168}"/>
               </a:ext>
             </a:extLst>
           </p:cNvPr>
@@ -1635,7 +1635,7 @@
           <p:cNvPr id="4" name="Symbol zastępczy zawartości 3">
             <a:extLst>
               <a:ext uri="{FF2B5EF4-FFF2-40B4-BE49-F238E27FC236}">
-                <a16:creationId xmlns:a16="http://schemas.microsoft.com/office/drawing/2014/main" xmlns="" id="{1E03840C-EF17-468E-868C-C4919D334D64}"/>
+                <a16:creationId xmlns:a16="http://schemas.microsoft.com/office/drawing/2014/main" id="{1E03840C-EF17-468E-868C-C4919D334D64}"/>
               </a:ext>
             </a:extLst>
           </p:cNvPr>
@@ -1697,7 +1697,7 @@
           <p:cNvPr id="5" name="Symbol zastępczy tekstu 4">
             <a:extLst>
               <a:ext uri="{FF2B5EF4-FFF2-40B4-BE49-F238E27FC236}">
-                <a16:creationId xmlns:a16="http://schemas.microsoft.com/office/drawing/2014/main" xmlns="" id="{85C5C115-9451-43B0-8113-096D74264224}"/>
+                <a16:creationId xmlns:a16="http://schemas.microsoft.com/office/drawing/2014/main" id="{85C5C115-9451-43B0-8113-096D74264224}"/>
               </a:ext>
             </a:extLst>
           </p:cNvPr>
@@ -1768,7 +1768,7 @@
           <p:cNvPr id="6" name="Symbol zastępczy zawartości 5">
             <a:extLst>
               <a:ext uri="{FF2B5EF4-FFF2-40B4-BE49-F238E27FC236}">
-                <a16:creationId xmlns:a16="http://schemas.microsoft.com/office/drawing/2014/main" xmlns="" id="{5637B97E-016E-468A-8021-5904784CC228}"/>
+                <a16:creationId xmlns:a16="http://schemas.microsoft.com/office/drawing/2014/main" id="{5637B97E-016E-468A-8021-5904784CC228}"/>
               </a:ext>
             </a:extLst>
           </p:cNvPr>
@@ -1830,7 +1830,7 @@
           <p:cNvPr id="7" name="Symbol zastępczy daty 6">
             <a:extLst>
               <a:ext uri="{FF2B5EF4-FFF2-40B4-BE49-F238E27FC236}">
-                <a16:creationId xmlns:a16="http://schemas.microsoft.com/office/drawing/2014/main" xmlns="" id="{A15AF9E8-1934-490F-9F1E-96E5D0301075}"/>
+                <a16:creationId xmlns:a16="http://schemas.microsoft.com/office/drawing/2014/main" id="{A15AF9E8-1934-490F-9F1E-96E5D0301075}"/>
               </a:ext>
             </a:extLst>
           </p:cNvPr>
@@ -1849,7 +1849,7 @@
             <a:fld id="{48C97C24-B5A0-4EEB-AF04-DC997EDCD259}" type="datetimeFigureOut">
               <a:rPr lang="pl-PL" smtClean="0"/>
               <a:pPr/>
-              <a:t>2018-02-28</a:t>
+              <a:t>15.11.2019</a:t>
             </a:fld>
             <a:endParaRPr lang="pl-PL"/>
           </a:p>
@@ -1860,7 +1860,7 @@
           <p:cNvPr id="8" name="Symbol zastępczy stopki 7">
             <a:extLst>
               <a:ext uri="{FF2B5EF4-FFF2-40B4-BE49-F238E27FC236}">
-                <a16:creationId xmlns:a16="http://schemas.microsoft.com/office/drawing/2014/main" xmlns="" id="{6EECFBE0-2CE5-4649-9E12-9C2AC3FF02FC}"/>
+                <a16:creationId xmlns:a16="http://schemas.microsoft.com/office/drawing/2014/main" id="{6EECFBE0-2CE5-4649-9E12-9C2AC3FF02FC}"/>
               </a:ext>
             </a:extLst>
           </p:cNvPr>
@@ -1885,7 +1885,7 @@
           <p:cNvPr id="9" name="Symbol zastępczy numeru slajdu 8">
             <a:extLst>
               <a:ext uri="{FF2B5EF4-FFF2-40B4-BE49-F238E27FC236}">
-                <a16:creationId xmlns:a16="http://schemas.microsoft.com/office/drawing/2014/main" xmlns="" id="{5EB8AC92-9428-4635-B3AB-C1D2E0B1F67B}"/>
+                <a16:creationId xmlns:a16="http://schemas.microsoft.com/office/drawing/2014/main" id="{5EB8AC92-9428-4635-B3AB-C1D2E0B1F67B}"/>
               </a:ext>
             </a:extLst>
           </p:cNvPr>
@@ -1913,7 +1913,7 @@
     </p:spTree>
     <p:extLst>
       <p:ext uri="{BB962C8B-B14F-4D97-AF65-F5344CB8AC3E}">
-        <p14:creationId xmlns:p14="http://schemas.microsoft.com/office/powerpoint/2010/main" xmlns="" val="2107821282"/>
+        <p14:creationId xmlns:p14="http://schemas.microsoft.com/office/powerpoint/2010/main" val="2107821282"/>
       </p:ext>
     </p:extLst>
   </p:cSld>
@@ -1945,7 +1945,7 @@
           <p:cNvPr id="2" name="Tytuł 1">
             <a:extLst>
               <a:ext uri="{FF2B5EF4-FFF2-40B4-BE49-F238E27FC236}">
-                <a16:creationId xmlns:a16="http://schemas.microsoft.com/office/drawing/2014/main" xmlns="" id="{7B2885CD-FBBD-4170-B980-E594A0D0A83A}"/>
+                <a16:creationId xmlns:a16="http://schemas.microsoft.com/office/drawing/2014/main" id="{7B2885CD-FBBD-4170-B980-E594A0D0A83A}"/>
               </a:ext>
             </a:extLst>
           </p:cNvPr>
@@ -1973,7 +1973,7 @@
           <p:cNvPr id="3" name="Symbol zastępczy daty 2">
             <a:extLst>
               <a:ext uri="{FF2B5EF4-FFF2-40B4-BE49-F238E27FC236}">
-                <a16:creationId xmlns:a16="http://schemas.microsoft.com/office/drawing/2014/main" xmlns="" id="{5DBBEDD7-FEAF-4C47-A89A-07353F0944B9}"/>
+                <a16:creationId xmlns:a16="http://schemas.microsoft.com/office/drawing/2014/main" id="{5DBBEDD7-FEAF-4C47-A89A-07353F0944B9}"/>
               </a:ext>
             </a:extLst>
           </p:cNvPr>
@@ -1992,7 +1992,7 @@
             <a:fld id="{48C97C24-B5A0-4EEB-AF04-DC997EDCD259}" type="datetimeFigureOut">
               <a:rPr lang="pl-PL" smtClean="0"/>
               <a:pPr/>
-              <a:t>2018-02-28</a:t>
+              <a:t>15.11.2019</a:t>
             </a:fld>
             <a:endParaRPr lang="pl-PL"/>
           </a:p>
@@ -2003,7 +2003,7 @@
           <p:cNvPr id="4" name="Symbol zastępczy stopki 3">
             <a:extLst>
               <a:ext uri="{FF2B5EF4-FFF2-40B4-BE49-F238E27FC236}">
-                <a16:creationId xmlns:a16="http://schemas.microsoft.com/office/drawing/2014/main" xmlns="" id="{D363B41F-212E-4E98-A735-0D7B118E7CA5}"/>
+                <a16:creationId xmlns:a16="http://schemas.microsoft.com/office/drawing/2014/main" id="{D363B41F-212E-4E98-A735-0D7B118E7CA5}"/>
               </a:ext>
             </a:extLst>
           </p:cNvPr>
@@ -2028,7 +2028,7 @@
           <p:cNvPr id="5" name="Symbol zastępczy numeru slajdu 4">
             <a:extLst>
               <a:ext uri="{FF2B5EF4-FFF2-40B4-BE49-F238E27FC236}">
-                <a16:creationId xmlns:a16="http://schemas.microsoft.com/office/drawing/2014/main" xmlns="" id="{70271B4F-14F6-4C48-98D1-F9875188CD5B}"/>
+                <a16:creationId xmlns:a16="http://schemas.microsoft.com/office/drawing/2014/main" id="{70271B4F-14F6-4C48-98D1-F9875188CD5B}"/>
               </a:ext>
             </a:extLst>
           </p:cNvPr>
@@ -2056,7 +2056,7 @@
     </p:spTree>
     <p:extLst>
       <p:ext uri="{BB962C8B-B14F-4D97-AF65-F5344CB8AC3E}">
-        <p14:creationId xmlns:p14="http://schemas.microsoft.com/office/powerpoint/2010/main" xmlns="" val="2819037196"/>
+        <p14:creationId xmlns:p14="http://schemas.microsoft.com/office/powerpoint/2010/main" val="2819037196"/>
       </p:ext>
     </p:extLst>
   </p:cSld>
@@ -2088,7 +2088,7 @@
           <p:cNvPr id="2" name="Symbol zastępczy daty 1">
             <a:extLst>
               <a:ext uri="{FF2B5EF4-FFF2-40B4-BE49-F238E27FC236}">
-                <a16:creationId xmlns:a16="http://schemas.microsoft.com/office/drawing/2014/main" xmlns="" id="{21D67FAA-490C-4C8E-9D94-821A7A3888A1}"/>
+                <a16:creationId xmlns:a16="http://schemas.microsoft.com/office/drawing/2014/main" id="{21D67FAA-490C-4C8E-9D94-821A7A3888A1}"/>
               </a:ext>
             </a:extLst>
           </p:cNvPr>
@@ -2107,7 +2107,7 @@
             <a:fld id="{48C97C24-B5A0-4EEB-AF04-DC997EDCD259}" type="datetimeFigureOut">
               <a:rPr lang="pl-PL" smtClean="0"/>
               <a:pPr/>
-              <a:t>2018-02-28</a:t>
+              <a:t>15.11.2019</a:t>
             </a:fld>
             <a:endParaRPr lang="pl-PL"/>
           </a:p>
@@ -2118,7 +2118,7 @@
           <p:cNvPr id="3" name="Symbol zastępczy stopki 2">
             <a:extLst>
               <a:ext uri="{FF2B5EF4-FFF2-40B4-BE49-F238E27FC236}">
-                <a16:creationId xmlns:a16="http://schemas.microsoft.com/office/drawing/2014/main" xmlns="" id="{AA1583EB-847F-4165-882C-4AA2987A1DA3}"/>
+                <a16:creationId xmlns:a16="http://schemas.microsoft.com/office/drawing/2014/main" id="{AA1583EB-847F-4165-882C-4AA2987A1DA3}"/>
               </a:ext>
             </a:extLst>
           </p:cNvPr>
@@ -2143,7 +2143,7 @@
           <p:cNvPr id="4" name="Symbol zastępczy numeru slajdu 3">
             <a:extLst>
               <a:ext uri="{FF2B5EF4-FFF2-40B4-BE49-F238E27FC236}">
-                <a16:creationId xmlns:a16="http://schemas.microsoft.com/office/drawing/2014/main" xmlns="" id="{4CEAC1C5-DCAD-45D3-8CBC-7BE5F5582AC7}"/>
+                <a16:creationId xmlns:a16="http://schemas.microsoft.com/office/drawing/2014/main" id="{4CEAC1C5-DCAD-45D3-8CBC-7BE5F5582AC7}"/>
               </a:ext>
             </a:extLst>
           </p:cNvPr>
@@ -2171,7 +2171,7 @@
     </p:spTree>
     <p:extLst>
       <p:ext uri="{BB962C8B-B14F-4D97-AF65-F5344CB8AC3E}">
-        <p14:creationId xmlns:p14="http://schemas.microsoft.com/office/powerpoint/2010/main" xmlns="" val="804806851"/>
+        <p14:creationId xmlns:p14="http://schemas.microsoft.com/office/powerpoint/2010/main" val="804806851"/>
       </p:ext>
     </p:extLst>
   </p:cSld>
@@ -2203,7 +2203,7 @@
           <p:cNvPr id="2" name="Tytuł 1">
             <a:extLst>
               <a:ext uri="{FF2B5EF4-FFF2-40B4-BE49-F238E27FC236}">
-                <a16:creationId xmlns:a16="http://schemas.microsoft.com/office/drawing/2014/main" xmlns="" id="{866E5A8C-5A03-4EA0-AAAA-383CF5E15F65}"/>
+                <a16:creationId xmlns:a16="http://schemas.microsoft.com/office/drawing/2014/main" id="{866E5A8C-5A03-4EA0-AAAA-383CF5E15F65}"/>
               </a:ext>
             </a:extLst>
           </p:cNvPr>
@@ -2240,7 +2240,7 @@
           <p:cNvPr id="3" name="Symbol zastępczy zawartości 2">
             <a:extLst>
               <a:ext uri="{FF2B5EF4-FFF2-40B4-BE49-F238E27FC236}">
-                <a16:creationId xmlns:a16="http://schemas.microsoft.com/office/drawing/2014/main" xmlns="" id="{20CA531A-62FC-4DD3-9CC3-7BB999936BD3}"/>
+                <a16:creationId xmlns:a16="http://schemas.microsoft.com/office/drawing/2014/main" id="{20CA531A-62FC-4DD3-9CC3-7BB999936BD3}"/>
               </a:ext>
             </a:extLst>
           </p:cNvPr>
@@ -2330,7 +2330,7 @@
           <p:cNvPr id="4" name="Symbol zastępczy tekstu 3">
             <a:extLst>
               <a:ext uri="{FF2B5EF4-FFF2-40B4-BE49-F238E27FC236}">
-                <a16:creationId xmlns:a16="http://schemas.microsoft.com/office/drawing/2014/main" xmlns="" id="{8C183027-8C80-45CC-9EB6-BCA668795910}"/>
+                <a16:creationId xmlns:a16="http://schemas.microsoft.com/office/drawing/2014/main" id="{8C183027-8C80-45CC-9EB6-BCA668795910}"/>
               </a:ext>
             </a:extLst>
           </p:cNvPr>
@@ -2401,7 +2401,7 @@
           <p:cNvPr id="5" name="Symbol zastępczy daty 4">
             <a:extLst>
               <a:ext uri="{FF2B5EF4-FFF2-40B4-BE49-F238E27FC236}">
-                <a16:creationId xmlns:a16="http://schemas.microsoft.com/office/drawing/2014/main" xmlns="" id="{7297BA27-1321-4238-92CC-1E0B473DBE15}"/>
+                <a16:creationId xmlns:a16="http://schemas.microsoft.com/office/drawing/2014/main" id="{7297BA27-1321-4238-92CC-1E0B473DBE15}"/>
               </a:ext>
             </a:extLst>
           </p:cNvPr>
@@ -2420,7 +2420,7 @@
             <a:fld id="{48C97C24-B5A0-4EEB-AF04-DC997EDCD259}" type="datetimeFigureOut">
               <a:rPr lang="pl-PL" smtClean="0"/>
               <a:pPr/>
-              <a:t>2018-02-28</a:t>
+              <a:t>15.11.2019</a:t>
             </a:fld>
             <a:endParaRPr lang="pl-PL"/>
           </a:p>
@@ -2431,7 +2431,7 @@
           <p:cNvPr id="6" name="Symbol zastępczy stopki 5">
             <a:extLst>
               <a:ext uri="{FF2B5EF4-FFF2-40B4-BE49-F238E27FC236}">
-                <a16:creationId xmlns:a16="http://schemas.microsoft.com/office/drawing/2014/main" xmlns="" id="{EE40C9D6-4795-4715-81A5-7AE06E56F4C9}"/>
+                <a16:creationId xmlns:a16="http://schemas.microsoft.com/office/drawing/2014/main" id="{EE40C9D6-4795-4715-81A5-7AE06E56F4C9}"/>
               </a:ext>
             </a:extLst>
           </p:cNvPr>
@@ -2456,7 +2456,7 @@
           <p:cNvPr id="7" name="Symbol zastępczy numeru slajdu 6">
             <a:extLst>
               <a:ext uri="{FF2B5EF4-FFF2-40B4-BE49-F238E27FC236}">
-                <a16:creationId xmlns:a16="http://schemas.microsoft.com/office/drawing/2014/main" xmlns="" id="{44C01220-9DF2-468E-AB74-B04800995FF8}"/>
+                <a16:creationId xmlns:a16="http://schemas.microsoft.com/office/drawing/2014/main" id="{44C01220-9DF2-468E-AB74-B04800995FF8}"/>
               </a:ext>
             </a:extLst>
           </p:cNvPr>
@@ -2484,7 +2484,7 @@
     </p:spTree>
     <p:extLst>
       <p:ext uri="{BB962C8B-B14F-4D97-AF65-F5344CB8AC3E}">
-        <p14:creationId xmlns:p14="http://schemas.microsoft.com/office/powerpoint/2010/main" xmlns="" val="3604078529"/>
+        <p14:creationId xmlns:p14="http://schemas.microsoft.com/office/powerpoint/2010/main" val="3604078529"/>
       </p:ext>
     </p:extLst>
   </p:cSld>
@@ -2516,7 +2516,7 @@
           <p:cNvPr id="2" name="Tytuł 1">
             <a:extLst>
               <a:ext uri="{FF2B5EF4-FFF2-40B4-BE49-F238E27FC236}">
-                <a16:creationId xmlns:a16="http://schemas.microsoft.com/office/drawing/2014/main" xmlns="" id="{BE245941-70B8-49A2-B6EF-923F19D14770}"/>
+                <a16:creationId xmlns:a16="http://schemas.microsoft.com/office/drawing/2014/main" id="{BE245941-70B8-49A2-B6EF-923F19D14770}"/>
               </a:ext>
             </a:extLst>
           </p:cNvPr>
@@ -2553,7 +2553,7 @@
           <p:cNvPr id="3" name="Symbol zastępczy obrazu 2">
             <a:extLst>
               <a:ext uri="{FF2B5EF4-FFF2-40B4-BE49-F238E27FC236}">
-                <a16:creationId xmlns:a16="http://schemas.microsoft.com/office/drawing/2014/main" xmlns="" id="{2E152FED-D21B-4BDF-A13B-B23964EB6DE0}"/>
+                <a16:creationId xmlns:a16="http://schemas.microsoft.com/office/drawing/2014/main" id="{2E152FED-D21B-4BDF-A13B-B23964EB6DE0}"/>
               </a:ext>
             </a:extLst>
           </p:cNvPr>
@@ -2620,7 +2620,7 @@
           <p:cNvPr id="4" name="Symbol zastępczy tekstu 3">
             <a:extLst>
               <a:ext uri="{FF2B5EF4-FFF2-40B4-BE49-F238E27FC236}">
-                <a16:creationId xmlns:a16="http://schemas.microsoft.com/office/drawing/2014/main" xmlns="" id="{7E75124F-131F-480A-A1D2-046139E576FF}"/>
+                <a16:creationId xmlns:a16="http://schemas.microsoft.com/office/drawing/2014/main" id="{7E75124F-131F-480A-A1D2-046139E576FF}"/>
               </a:ext>
             </a:extLst>
           </p:cNvPr>
@@ -2691,7 +2691,7 @@
           <p:cNvPr id="5" name="Symbol zastępczy daty 4">
             <a:extLst>
               <a:ext uri="{FF2B5EF4-FFF2-40B4-BE49-F238E27FC236}">
-                <a16:creationId xmlns:a16="http://schemas.microsoft.com/office/drawing/2014/main" xmlns="" id="{35A03D02-0D57-48AF-B83C-76DF688A83F2}"/>
+                <a16:creationId xmlns:a16="http://schemas.microsoft.com/office/drawing/2014/main" id="{35A03D02-0D57-48AF-B83C-76DF688A83F2}"/>
               </a:ext>
             </a:extLst>
           </p:cNvPr>
@@ -2710,7 +2710,7 @@
             <a:fld id="{48C97C24-B5A0-4EEB-AF04-DC997EDCD259}" type="datetimeFigureOut">
               <a:rPr lang="pl-PL" smtClean="0"/>
               <a:pPr/>
-              <a:t>2018-02-28</a:t>
+              <a:t>15.11.2019</a:t>
             </a:fld>
             <a:endParaRPr lang="pl-PL"/>
           </a:p>
@@ -2721,7 +2721,7 @@
           <p:cNvPr id="6" name="Symbol zastępczy stopki 5">
             <a:extLst>
               <a:ext uri="{FF2B5EF4-FFF2-40B4-BE49-F238E27FC236}">
-                <a16:creationId xmlns:a16="http://schemas.microsoft.com/office/drawing/2014/main" xmlns="" id="{C9F7F86E-A2DC-46D3-9C1A-CCB707A4EE28}"/>
+                <a16:creationId xmlns:a16="http://schemas.microsoft.com/office/drawing/2014/main" id="{C9F7F86E-A2DC-46D3-9C1A-CCB707A4EE28}"/>
               </a:ext>
             </a:extLst>
           </p:cNvPr>
@@ -2746,7 +2746,7 @@
           <p:cNvPr id="7" name="Symbol zastępczy numeru slajdu 6">
             <a:extLst>
               <a:ext uri="{FF2B5EF4-FFF2-40B4-BE49-F238E27FC236}">
-                <a16:creationId xmlns:a16="http://schemas.microsoft.com/office/drawing/2014/main" xmlns="" id="{D4319EE7-85DE-4198-93D1-B9A648CF2D42}"/>
+                <a16:creationId xmlns:a16="http://schemas.microsoft.com/office/drawing/2014/main" id="{D4319EE7-85DE-4198-93D1-B9A648CF2D42}"/>
               </a:ext>
             </a:extLst>
           </p:cNvPr>
@@ -2774,7 +2774,7 @@
     </p:spTree>
     <p:extLst>
       <p:ext uri="{BB962C8B-B14F-4D97-AF65-F5344CB8AC3E}">
-        <p14:creationId xmlns:p14="http://schemas.microsoft.com/office/powerpoint/2010/main" xmlns="" val="3349431366"/>
+        <p14:creationId xmlns:p14="http://schemas.microsoft.com/office/powerpoint/2010/main" val="3349431366"/>
       </p:ext>
     </p:extLst>
   </p:cSld>
@@ -2811,7 +2811,7 @@
           <p:cNvPr id="2" name="Symbol zastępczy tytułu 1">
             <a:extLst>
               <a:ext uri="{FF2B5EF4-FFF2-40B4-BE49-F238E27FC236}">
-                <a16:creationId xmlns:a16="http://schemas.microsoft.com/office/drawing/2014/main" xmlns="" id="{CA3BD42A-61F5-4E6D-BF4F-B2F673CF9F1C}"/>
+                <a16:creationId xmlns:a16="http://schemas.microsoft.com/office/drawing/2014/main" id="{CA3BD42A-61F5-4E6D-BF4F-B2F673CF9F1C}"/>
               </a:ext>
             </a:extLst>
           </p:cNvPr>
@@ -2849,7 +2849,7 @@
           <p:cNvPr id="3" name="Symbol zastępczy tekstu 2">
             <a:extLst>
               <a:ext uri="{FF2B5EF4-FFF2-40B4-BE49-F238E27FC236}">
-                <a16:creationId xmlns:a16="http://schemas.microsoft.com/office/drawing/2014/main" xmlns="" id="{4FC10C80-D908-442B-ACB7-F4FE949BAEED}"/>
+                <a16:creationId xmlns:a16="http://schemas.microsoft.com/office/drawing/2014/main" id="{4FC10C80-D908-442B-ACB7-F4FE949BAEED}"/>
               </a:ext>
             </a:extLst>
           </p:cNvPr>
@@ -2916,7 +2916,7 @@
           <p:cNvPr id="4" name="Symbol zastępczy daty 3">
             <a:extLst>
               <a:ext uri="{FF2B5EF4-FFF2-40B4-BE49-F238E27FC236}">
-                <a16:creationId xmlns:a16="http://schemas.microsoft.com/office/drawing/2014/main" xmlns="" id="{EF04F4C0-B950-4B30-9E9F-0AF389883839}"/>
+                <a16:creationId xmlns:a16="http://schemas.microsoft.com/office/drawing/2014/main" id="{EF04F4C0-B950-4B30-9E9F-0AF389883839}"/>
               </a:ext>
             </a:extLst>
           </p:cNvPr>
@@ -2953,7 +2953,7 @@
             <a:fld id="{48C97C24-B5A0-4EEB-AF04-DC997EDCD259}" type="datetimeFigureOut">
               <a:rPr lang="pl-PL" smtClean="0"/>
               <a:pPr/>
-              <a:t>2018-02-28</a:t>
+              <a:t>15.11.2019</a:t>
             </a:fld>
             <a:endParaRPr lang="pl-PL"/>
           </a:p>
@@ -2964,7 +2964,7 @@
           <p:cNvPr id="5" name="Symbol zastępczy stopki 4">
             <a:extLst>
               <a:ext uri="{FF2B5EF4-FFF2-40B4-BE49-F238E27FC236}">
-                <a16:creationId xmlns:a16="http://schemas.microsoft.com/office/drawing/2014/main" xmlns="" id="{3E563B2C-1EF0-4B0E-B330-15AB9DEE9190}"/>
+                <a16:creationId xmlns:a16="http://schemas.microsoft.com/office/drawing/2014/main" id="{3E563B2C-1EF0-4B0E-B330-15AB9DEE9190}"/>
               </a:ext>
             </a:extLst>
           </p:cNvPr>
@@ -3007,7 +3007,7 @@
           <p:cNvPr id="6" name="Symbol zastępczy numeru slajdu 5">
             <a:extLst>
               <a:ext uri="{FF2B5EF4-FFF2-40B4-BE49-F238E27FC236}">
-                <a16:creationId xmlns:a16="http://schemas.microsoft.com/office/drawing/2014/main" xmlns="" id="{008004DA-8E4B-4ECE-9EB5-8DE1B1D9DD4C}"/>
+                <a16:creationId xmlns:a16="http://schemas.microsoft.com/office/drawing/2014/main" id="{008004DA-8E4B-4ECE-9EB5-8DE1B1D9DD4C}"/>
               </a:ext>
             </a:extLst>
           </p:cNvPr>
@@ -3053,7 +3053,7 @@
     </p:spTree>
     <p:extLst>
       <p:ext uri="{BB962C8B-B14F-4D97-AF65-F5344CB8AC3E}">
-        <p14:creationId xmlns:p14="http://schemas.microsoft.com/office/powerpoint/2010/main" xmlns="" val="1505403407"/>
+        <p14:creationId xmlns:p14="http://schemas.microsoft.com/office/powerpoint/2010/main" val="1505403407"/>
       </p:ext>
     </p:extLst>
   </p:cSld>
@@ -3376,7 +3376,7 @@
           <p:cNvPr id="2" name="Tytuł 1">
             <a:extLst>
               <a:ext uri="{FF2B5EF4-FFF2-40B4-BE49-F238E27FC236}">
-                <a16:creationId xmlns:a16="http://schemas.microsoft.com/office/drawing/2014/main" xmlns="" id="{6B80CC72-6FBA-4F30-BFE0-BC78A62FAEB7}"/>
+                <a16:creationId xmlns:a16="http://schemas.microsoft.com/office/drawing/2014/main" id="{6B80CC72-6FBA-4F30-BFE0-BC78A62FAEB7}"/>
               </a:ext>
             </a:extLst>
           </p:cNvPr>
@@ -3404,7 +3404,7 @@
           <p:cNvPr id="3" name="Podtytuł 2">
             <a:extLst>
               <a:ext uri="{FF2B5EF4-FFF2-40B4-BE49-F238E27FC236}">
-                <a16:creationId xmlns:a16="http://schemas.microsoft.com/office/drawing/2014/main" xmlns="" id="{24F9088A-5ABE-400A-95F6-57770C21F661}"/>
+                <a16:creationId xmlns:a16="http://schemas.microsoft.com/office/drawing/2014/main" id="{24F9088A-5ABE-400A-95F6-57770C21F661}"/>
               </a:ext>
             </a:extLst>
           </p:cNvPr>
@@ -3435,20 +3435,13 @@
     </p:spTree>
     <p:extLst>
       <p:ext uri="{BB962C8B-B14F-4D97-AF65-F5344CB8AC3E}">
-        <p14:creationId xmlns:p14="http://schemas.microsoft.com/office/powerpoint/2010/main" xmlns="" val="4114485027"/>
+        <p14:creationId xmlns:p14="http://schemas.microsoft.com/office/powerpoint/2010/main" val="4114485027"/>
       </p:ext>
     </p:extLst>
   </p:cSld>
   <p:clrMapOvr>
     <a:masterClrMapping/>
   </p:clrMapOvr>
-  <p:timing>
-    <p:tnLst>
-      <p:par>
-        <p:cTn id="1" dur="indefinite" restart="never" nodeType="tmRoot"/>
-      </p:par>
-    </p:tnLst>
-  </p:timing>
 </p:sld>
 </file>
 
@@ -3474,7 +3467,7 @@
           <p:cNvPr id="2" name="Tytuł 1">
             <a:extLst>
               <a:ext uri="{FF2B5EF4-FFF2-40B4-BE49-F238E27FC236}">
-                <a16:creationId xmlns:a16="http://schemas.microsoft.com/office/drawing/2014/main" xmlns="" id="{BB8CEA7B-F5E6-F94A-8D72-20CCCF4E90AA}"/>
+                <a16:creationId xmlns:a16="http://schemas.microsoft.com/office/drawing/2014/main" id="{BB8CEA7B-F5E6-F94A-8D72-20CCCF4E90AA}"/>
               </a:ext>
             </a:extLst>
           </p:cNvPr>
@@ -3497,8 +3490,8 @@
           </a:p>
         </p:txBody>
       </p:sp>
-      <mc:AlternateContent xmlns:mc="http://schemas.openxmlformats.org/markup-compatibility/2006">
-        <mc:Choice xmlns:a14="http://schemas.microsoft.com/office/drawing/2010/main" xmlns="" Requires="a14">
+      <mc:AlternateContent xmlns:mc="http://schemas.openxmlformats.org/markup-compatibility/2006" xmlns:a14="http://schemas.microsoft.com/office/drawing/2010/main">
+        <mc:Choice Requires="a14">
           <p:sp>
             <p:nvSpPr>
               <p:cNvPr id="3" name="Symbol zastępczy zawartości 2">
@@ -3862,7 +3855,7 @@
             </p:txBody>
           </p:sp>
         </mc:Choice>
-        <mc:Fallback>
+        <mc:Fallback xmlns="">
           <p:sp>
             <p:nvSpPr>
               <p:cNvPr id="3" name="Symbol zastępczy zawartości 2">
@@ -3905,20 +3898,13 @@
     </p:spTree>
     <p:extLst>
       <p:ext uri="{BB962C8B-B14F-4D97-AF65-F5344CB8AC3E}">
-        <p14:creationId xmlns:p14="http://schemas.microsoft.com/office/powerpoint/2010/main" xmlns="" val="1080595380"/>
+        <p14:creationId xmlns:p14="http://schemas.microsoft.com/office/powerpoint/2010/main" val="3909487212"/>
       </p:ext>
     </p:extLst>
   </p:cSld>
   <p:clrMapOvr>
     <a:masterClrMapping/>
   </p:clrMapOvr>
-  <p:timing>
-    <p:tnLst>
-      <p:par>
-        <p:cTn id="1" dur="indefinite" restart="never" nodeType="tmRoot"/>
-      </p:par>
-    </p:tnLst>
-  </p:timing>
 </p:sld>
 </file>
 
@@ -3944,7 +3930,7 @@
           <p:cNvPr id="2" name="Tytuł 1">
             <a:extLst>
               <a:ext uri="{FF2B5EF4-FFF2-40B4-BE49-F238E27FC236}">
-                <a16:creationId xmlns:a16="http://schemas.microsoft.com/office/drawing/2014/main" xmlns="" id="{8073ACDB-AFB9-45E6-BFDE-95A7AAE97E57}"/>
+                <a16:creationId xmlns:a16="http://schemas.microsoft.com/office/drawing/2014/main" id="{8073ACDB-AFB9-45E6-BFDE-95A7AAE97E57}"/>
               </a:ext>
             </a:extLst>
           </p:cNvPr>
@@ -3972,7 +3958,7 @@
           <p:cNvPr id="3" name="Symbol zastępczy zawartości 2">
             <a:extLst>
               <a:ext uri="{FF2B5EF4-FFF2-40B4-BE49-F238E27FC236}">
-                <a16:creationId xmlns:a16="http://schemas.microsoft.com/office/drawing/2014/main" xmlns="" id="{D2D43E5B-CF53-4E0D-90CD-011C71555D41}"/>
+                <a16:creationId xmlns:a16="http://schemas.microsoft.com/office/drawing/2014/main" id="{D2D43E5B-CF53-4E0D-90CD-011C71555D41}"/>
               </a:ext>
             </a:extLst>
           </p:cNvPr>
@@ -4177,7 +4163,7 @@
               <a:t> </a:t>
             </a:r>
             <a:r>
-              <a:rPr lang="pl-PL" b="1" i="1" smtClean="0">
+              <a:rPr lang="pl-PL" b="1" i="1" dirty="0" err="1">
                 <a:solidFill>
                   <a:schemeClr val="accent6"/>
                 </a:solidFill>
@@ -4199,7 +4185,7 @@
     </p:spTree>
     <p:extLst>
       <p:ext uri="{BB962C8B-B14F-4D97-AF65-F5344CB8AC3E}">
-        <p14:creationId xmlns:p14="http://schemas.microsoft.com/office/powerpoint/2010/main" xmlns="" val="1171977843"/>
+        <p14:creationId xmlns:p14="http://schemas.microsoft.com/office/powerpoint/2010/main" val="1171977843"/>
       </p:ext>
     </p:extLst>
   </p:cSld>
@@ -4209,7 +4195,226 @@
   <p:timing>
     <p:tnLst>
       <p:par>
-        <p:cTn id="1" dur="indefinite" restart="never" nodeType="tmRoot"/>
+        <p:cTn id="1" dur="indefinite" restart="never" nodeType="tmRoot">
+          <p:childTnLst>
+            <p:seq concurrent="1" nextAc="seek">
+              <p:cTn id="2" dur="indefinite" nodeType="mainSeq">
+                <p:childTnLst>
+                  <p:par>
+                    <p:cTn id="3" fill="hold">
+                      <p:stCondLst>
+                        <p:cond delay="indefinite"/>
+                      </p:stCondLst>
+                      <p:childTnLst>
+                        <p:par>
+                          <p:cTn id="4" fill="hold">
+                            <p:stCondLst>
+                              <p:cond delay="0"/>
+                            </p:stCondLst>
+                            <p:childTnLst>
+                              <p:par>
+                                <p:cTn id="5" presetID="1" presetClass="entr" presetSubtype="0" fill="hold" nodeType="clickEffect">
+                                  <p:stCondLst>
+                                    <p:cond delay="0"/>
+                                  </p:stCondLst>
+                                  <p:childTnLst>
+                                    <p:set>
+                                      <p:cBhvr>
+                                        <p:cTn id="6" dur="1" fill="hold">
+                                          <p:stCondLst>
+                                            <p:cond delay="0"/>
+                                          </p:stCondLst>
+                                        </p:cTn>
+                                        <p:tgtEl>
+                                          <p:spTgt spid="3">
+                                            <p:txEl>
+                                              <p:pRg st="0" end="0"/>
+                                            </p:txEl>
+                                          </p:spTgt>
+                                        </p:tgtEl>
+                                        <p:attrNameLst>
+                                          <p:attrName>style.visibility</p:attrName>
+                                        </p:attrNameLst>
+                                      </p:cBhvr>
+                                      <p:to>
+                                        <p:strVal val="visible"/>
+                                      </p:to>
+                                    </p:set>
+                                  </p:childTnLst>
+                                </p:cTn>
+                              </p:par>
+                            </p:childTnLst>
+                          </p:cTn>
+                        </p:par>
+                      </p:childTnLst>
+                    </p:cTn>
+                  </p:par>
+                  <p:par>
+                    <p:cTn id="7" fill="hold">
+                      <p:stCondLst>
+                        <p:cond delay="indefinite"/>
+                      </p:stCondLst>
+                      <p:childTnLst>
+                        <p:par>
+                          <p:cTn id="8" fill="hold">
+                            <p:stCondLst>
+                              <p:cond delay="0"/>
+                            </p:stCondLst>
+                            <p:childTnLst>
+                              <p:par>
+                                <p:cTn id="9" presetID="1" presetClass="entr" presetSubtype="0" fill="hold" nodeType="clickEffect">
+                                  <p:stCondLst>
+                                    <p:cond delay="0"/>
+                                  </p:stCondLst>
+                                  <p:childTnLst>
+                                    <p:set>
+                                      <p:cBhvr>
+                                        <p:cTn id="10" dur="1" fill="hold">
+                                          <p:stCondLst>
+                                            <p:cond delay="0"/>
+                                          </p:stCondLst>
+                                        </p:cTn>
+                                        <p:tgtEl>
+                                          <p:spTgt spid="3">
+                                            <p:txEl>
+                                              <p:pRg st="1" end="1"/>
+                                            </p:txEl>
+                                          </p:spTgt>
+                                        </p:tgtEl>
+                                        <p:attrNameLst>
+                                          <p:attrName>style.visibility</p:attrName>
+                                        </p:attrNameLst>
+                                      </p:cBhvr>
+                                      <p:to>
+                                        <p:strVal val="visible"/>
+                                      </p:to>
+                                    </p:set>
+                                  </p:childTnLst>
+                                </p:cTn>
+                              </p:par>
+                            </p:childTnLst>
+                          </p:cTn>
+                        </p:par>
+                      </p:childTnLst>
+                    </p:cTn>
+                  </p:par>
+                  <p:par>
+                    <p:cTn id="11" fill="hold">
+                      <p:stCondLst>
+                        <p:cond delay="indefinite"/>
+                      </p:stCondLst>
+                      <p:childTnLst>
+                        <p:par>
+                          <p:cTn id="12" fill="hold">
+                            <p:stCondLst>
+                              <p:cond delay="0"/>
+                            </p:stCondLst>
+                            <p:childTnLst>
+                              <p:par>
+                                <p:cTn id="13" presetID="1" presetClass="entr" presetSubtype="0" fill="hold" nodeType="clickEffect">
+                                  <p:stCondLst>
+                                    <p:cond delay="0"/>
+                                  </p:stCondLst>
+                                  <p:childTnLst>
+                                    <p:set>
+                                      <p:cBhvr>
+                                        <p:cTn id="14" dur="1" fill="hold">
+                                          <p:stCondLst>
+                                            <p:cond delay="0"/>
+                                          </p:stCondLst>
+                                        </p:cTn>
+                                        <p:tgtEl>
+                                          <p:spTgt spid="3">
+                                            <p:txEl>
+                                              <p:pRg st="2" end="2"/>
+                                            </p:txEl>
+                                          </p:spTgt>
+                                        </p:tgtEl>
+                                        <p:attrNameLst>
+                                          <p:attrName>style.visibility</p:attrName>
+                                        </p:attrNameLst>
+                                      </p:cBhvr>
+                                      <p:to>
+                                        <p:strVal val="visible"/>
+                                      </p:to>
+                                    </p:set>
+                                  </p:childTnLst>
+                                </p:cTn>
+                              </p:par>
+                            </p:childTnLst>
+                          </p:cTn>
+                        </p:par>
+                      </p:childTnLst>
+                    </p:cTn>
+                  </p:par>
+                  <p:par>
+                    <p:cTn id="15" fill="hold">
+                      <p:stCondLst>
+                        <p:cond delay="indefinite"/>
+                      </p:stCondLst>
+                      <p:childTnLst>
+                        <p:par>
+                          <p:cTn id="16" fill="hold">
+                            <p:stCondLst>
+                              <p:cond delay="0"/>
+                            </p:stCondLst>
+                            <p:childTnLst>
+                              <p:par>
+                                <p:cTn id="17" presetID="1" presetClass="entr" presetSubtype="0" fill="hold" nodeType="clickEffect">
+                                  <p:stCondLst>
+                                    <p:cond delay="0"/>
+                                  </p:stCondLst>
+                                  <p:childTnLst>
+                                    <p:set>
+                                      <p:cBhvr>
+                                        <p:cTn id="18" dur="1" fill="hold">
+                                          <p:stCondLst>
+                                            <p:cond delay="0"/>
+                                          </p:stCondLst>
+                                        </p:cTn>
+                                        <p:tgtEl>
+                                          <p:spTgt spid="3">
+                                            <p:txEl>
+                                              <p:pRg st="3" end="3"/>
+                                            </p:txEl>
+                                          </p:spTgt>
+                                        </p:tgtEl>
+                                        <p:attrNameLst>
+                                          <p:attrName>style.visibility</p:attrName>
+                                        </p:attrNameLst>
+                                      </p:cBhvr>
+                                      <p:to>
+                                        <p:strVal val="visible"/>
+                                      </p:to>
+                                    </p:set>
+                                  </p:childTnLst>
+                                </p:cTn>
+                              </p:par>
+                            </p:childTnLst>
+                          </p:cTn>
+                        </p:par>
+                      </p:childTnLst>
+                    </p:cTn>
+                  </p:par>
+                </p:childTnLst>
+              </p:cTn>
+              <p:prevCondLst>
+                <p:cond evt="onPrev" delay="0">
+                  <p:tgtEl>
+                    <p:sldTgt/>
+                  </p:tgtEl>
+                </p:cond>
+              </p:prevCondLst>
+              <p:nextCondLst>
+                <p:cond evt="onNext" delay="0">
+                  <p:tgtEl>
+                    <p:sldTgt/>
+                  </p:tgtEl>
+                </p:cond>
+              </p:nextCondLst>
+            </p:seq>
+          </p:childTnLst>
+        </p:cTn>
       </p:par>
     </p:tnLst>
   </p:timing>
@@ -4238,7 +4443,7 @@
           <p:cNvPr id="2" name="Tytuł 1">
             <a:extLst>
               <a:ext uri="{FF2B5EF4-FFF2-40B4-BE49-F238E27FC236}">
-                <a16:creationId xmlns:a16="http://schemas.microsoft.com/office/drawing/2014/main" xmlns="" id="{D99ABC43-81A0-E14F-BE59-89EC58A92B6E}"/>
+                <a16:creationId xmlns:a16="http://schemas.microsoft.com/office/drawing/2014/main" id="{D99ABC43-81A0-E14F-BE59-89EC58A92B6E}"/>
               </a:ext>
             </a:extLst>
           </p:cNvPr>
@@ -4266,7 +4471,7 @@
           <p:cNvPr id="3" name="Symbol zastępczy zawartości 2">
             <a:extLst>
               <a:ext uri="{FF2B5EF4-FFF2-40B4-BE49-F238E27FC236}">
-                <a16:creationId xmlns:a16="http://schemas.microsoft.com/office/drawing/2014/main" xmlns="" id="{D583B86E-D1A9-244D-BCE1-DCD5F14D2236}"/>
+                <a16:creationId xmlns:a16="http://schemas.microsoft.com/office/drawing/2014/main" id="{D583B86E-D1A9-244D-BCE1-DCD5F14D2236}"/>
               </a:ext>
             </a:extLst>
           </p:cNvPr>
@@ -4288,14 +4493,14 @@
               <a:buNone/>
             </a:pPr>
             <a:r>
-              <a:rPr lang="pl-PL" sz="2400" b="1" dirty="0"/>
+              <a:rPr lang="pl-PL" sz="3200" b="1" dirty="0"/>
               <a:t>Dane:</a:t>
             </a:r>
           </a:p>
           <a:p>
             <a:pPr lvl="1"/>
             <a:r>
-              <a:rPr lang="pl-PL" dirty="0"/>
+              <a:rPr lang="pl-PL" sz="3200" dirty="0"/>
               <a:t>Dwie liczby naturalne większe od zera</a:t>
             </a:r>
           </a:p>
@@ -4303,15 +4508,21 @@
             <a:pPr marL="0" indent="0">
               <a:buNone/>
             </a:pPr>
-            <a:r>
-              <a:rPr lang="pl-PL" sz="2400" b="1" dirty="0"/>
+            <a:endParaRPr lang="pl-PL" sz="3200" b="1" dirty="0"/>
+          </a:p>
+          <a:p>
+            <a:pPr marL="0" indent="0">
+              <a:buNone/>
+            </a:pPr>
+            <a:r>
+              <a:rPr lang="pl-PL" sz="3200" b="1" dirty="0"/>
               <a:t>Wynik:</a:t>
             </a:r>
           </a:p>
           <a:p>
             <a:pPr lvl="1"/>
             <a:r>
-              <a:rPr lang="pl-PL" dirty="0"/>
+              <a:rPr lang="pl-PL" sz="3200" dirty="0"/>
               <a:t>Najmniejsza wspólna wielokrotność podanych liczb</a:t>
             </a:r>
           </a:p>
@@ -4320,20 +4531,13 @@
     </p:spTree>
     <p:extLst>
       <p:ext uri="{BB962C8B-B14F-4D97-AF65-F5344CB8AC3E}">
-        <p14:creationId xmlns:p14="http://schemas.microsoft.com/office/powerpoint/2010/main" xmlns="" val="2190212847"/>
+        <p14:creationId xmlns:p14="http://schemas.microsoft.com/office/powerpoint/2010/main" val="2190212847"/>
       </p:ext>
     </p:extLst>
   </p:cSld>
   <p:clrMapOvr>
     <a:masterClrMapping/>
   </p:clrMapOvr>
-  <p:timing>
-    <p:tnLst>
-      <p:par>
-        <p:cTn id="1" dur="indefinite" restart="never" nodeType="tmRoot"/>
-      </p:par>
-    </p:tnLst>
-  </p:timing>
 </p:sld>
 </file>
 
@@ -4359,7 +4563,7 @@
           <p:cNvPr id="2" name="Tytuł 1">
             <a:extLst>
               <a:ext uri="{FF2B5EF4-FFF2-40B4-BE49-F238E27FC236}">
-                <a16:creationId xmlns:a16="http://schemas.microsoft.com/office/drawing/2014/main" xmlns="" id="{BB8CEA7B-F5E6-F94A-8D72-20CCCF4E90AA}"/>
+                <a16:creationId xmlns:a16="http://schemas.microsoft.com/office/drawing/2014/main" id="{BB8CEA7B-F5E6-F94A-8D72-20CCCF4E90AA}"/>
               </a:ext>
             </a:extLst>
           </p:cNvPr>
@@ -4387,7 +4591,7 @@
           <p:cNvPr id="3" name="Symbol zastępczy zawartości 2">
             <a:extLst>
               <a:ext uri="{FF2B5EF4-FFF2-40B4-BE49-F238E27FC236}">
-                <a16:creationId xmlns:a16="http://schemas.microsoft.com/office/drawing/2014/main" xmlns="" id="{97A51C67-3B6F-F141-85EC-3FFA662DC0B1}"/>
+                <a16:creationId xmlns:a16="http://schemas.microsoft.com/office/drawing/2014/main" id="{97A51C67-3B6F-F141-85EC-3FFA662DC0B1}"/>
               </a:ext>
             </a:extLst>
           </p:cNvPr>
@@ -4408,11 +4612,7 @@
             </a:pPr>
             <a:r>
               <a:rPr lang="pl-PL" dirty="0"/>
-              <a:t>Obliczamy kolejne wielokrotności obu liczb tak długo, aż uzyskamy takie same </a:t>
-            </a:r>
-            <a:r>
-              <a:rPr lang="pl-PL" dirty="0" smtClean="0"/>
-              <a:t>wartości.</a:t>
+              <a:t>Obliczamy kolejne wielokrotności obu liczb tak długo, aż uzyskamy takie same wartości.</a:t>
             </a:r>
           </a:p>
           <a:p>
@@ -4420,30 +4620,22 @@
               <a:buNone/>
             </a:pPr>
             <a:r>
-              <a:rPr lang="pl-PL" dirty="0" smtClean="0"/>
+              <a:rPr lang="pl-PL" dirty="0"/>
               <a:t>W kolejnych krokach zwiększamy mniejszą z liczb, większą pozostawiając bez zmiany.</a:t>
             </a:r>
-            <a:endParaRPr lang="pl-PL" dirty="0"/>
           </a:p>
         </p:txBody>
       </p:sp>
     </p:spTree>
     <p:extLst>
       <p:ext uri="{BB962C8B-B14F-4D97-AF65-F5344CB8AC3E}">
-        <p14:creationId xmlns:p14="http://schemas.microsoft.com/office/powerpoint/2010/main" xmlns="" val="2805968717"/>
+        <p14:creationId xmlns:p14="http://schemas.microsoft.com/office/powerpoint/2010/main" val="2805968717"/>
       </p:ext>
     </p:extLst>
   </p:cSld>
   <p:clrMapOvr>
     <a:masterClrMapping/>
   </p:clrMapOvr>
-  <p:timing>
-    <p:tnLst>
-      <p:par>
-        <p:cTn id="1" dur="indefinite" restart="never" nodeType="tmRoot"/>
-      </p:par>
-    </p:tnLst>
-  </p:timing>
 </p:sld>
 </file>
 
@@ -4469,7 +4661,7 @@
           <p:cNvPr id="2" name="Tytuł 1">
             <a:extLst>
               <a:ext uri="{FF2B5EF4-FFF2-40B4-BE49-F238E27FC236}">
-                <a16:creationId xmlns:a16="http://schemas.microsoft.com/office/drawing/2014/main" xmlns="" id="{6F844C51-8DEF-0A49-BA2D-B0F5E8A687B7}"/>
+                <a16:creationId xmlns:a16="http://schemas.microsoft.com/office/drawing/2014/main" id="{6F844C51-8DEF-0A49-BA2D-B0F5E8A687B7}"/>
               </a:ext>
             </a:extLst>
           </p:cNvPr>
@@ -4497,7 +4689,7 @@
           <p:cNvPr id="3" name="Symbol zastępczy zawartości 2">
             <a:extLst>
               <a:ext uri="{FF2B5EF4-FFF2-40B4-BE49-F238E27FC236}">
-                <a16:creationId xmlns:a16="http://schemas.microsoft.com/office/drawing/2014/main" xmlns="" id="{4BFB4DF4-8D92-8147-B539-9B992A9E79A6}"/>
+                <a16:creationId xmlns:a16="http://schemas.microsoft.com/office/drawing/2014/main" id="{4BFB4DF4-8D92-8147-B539-9B992A9E79A6}"/>
               </a:ext>
             </a:extLst>
           </p:cNvPr>
@@ -4713,7 +4905,7 @@
     </p:spTree>
     <p:extLst>
       <p:ext uri="{BB962C8B-B14F-4D97-AF65-F5344CB8AC3E}">
-        <p14:creationId xmlns:p14="http://schemas.microsoft.com/office/powerpoint/2010/main" xmlns="" val="2020852475"/>
+        <p14:creationId xmlns:p14="http://schemas.microsoft.com/office/powerpoint/2010/main" val="1709611412"/>
       </p:ext>
     </p:extLst>
   </p:cSld>
@@ -4723,7 +4915,422 @@
   <p:timing>
     <p:tnLst>
       <p:par>
-        <p:cTn id="1" dur="indefinite" restart="never" nodeType="tmRoot"/>
+        <p:cTn id="1" dur="indefinite" restart="never" nodeType="tmRoot">
+          <p:childTnLst>
+            <p:seq concurrent="1" nextAc="seek">
+              <p:cTn id="2" dur="indefinite" nodeType="mainSeq">
+                <p:childTnLst>
+                  <p:par>
+                    <p:cTn id="3" fill="hold">
+                      <p:stCondLst>
+                        <p:cond delay="indefinite"/>
+                      </p:stCondLst>
+                      <p:childTnLst>
+                        <p:par>
+                          <p:cTn id="4" fill="hold">
+                            <p:stCondLst>
+                              <p:cond delay="0"/>
+                            </p:stCondLst>
+                            <p:childTnLst>
+                              <p:par>
+                                <p:cTn id="5" presetID="1" presetClass="entr" presetSubtype="0" fill="hold" nodeType="clickEffect">
+                                  <p:stCondLst>
+                                    <p:cond delay="0"/>
+                                  </p:stCondLst>
+                                  <p:childTnLst>
+                                    <p:set>
+                                      <p:cBhvr>
+                                        <p:cTn id="6" dur="1" fill="hold">
+                                          <p:stCondLst>
+                                            <p:cond delay="0"/>
+                                          </p:stCondLst>
+                                        </p:cTn>
+                                        <p:tgtEl>
+                                          <p:spTgt spid="3">
+                                            <p:txEl>
+                                              <p:pRg st="0" end="0"/>
+                                            </p:txEl>
+                                          </p:spTgt>
+                                        </p:tgtEl>
+                                        <p:attrNameLst>
+                                          <p:attrName>style.visibility</p:attrName>
+                                        </p:attrNameLst>
+                                      </p:cBhvr>
+                                      <p:to>
+                                        <p:strVal val="visible"/>
+                                      </p:to>
+                                    </p:set>
+                                  </p:childTnLst>
+                                </p:cTn>
+                              </p:par>
+                            </p:childTnLst>
+                          </p:cTn>
+                        </p:par>
+                      </p:childTnLst>
+                    </p:cTn>
+                  </p:par>
+                  <p:par>
+                    <p:cTn id="7" fill="hold">
+                      <p:stCondLst>
+                        <p:cond delay="indefinite"/>
+                      </p:stCondLst>
+                      <p:childTnLst>
+                        <p:par>
+                          <p:cTn id="8" fill="hold">
+                            <p:stCondLst>
+                              <p:cond delay="0"/>
+                            </p:stCondLst>
+                            <p:childTnLst>
+                              <p:par>
+                                <p:cTn id="9" presetID="1" presetClass="entr" presetSubtype="0" fill="hold" nodeType="clickEffect">
+                                  <p:stCondLst>
+                                    <p:cond delay="0"/>
+                                  </p:stCondLst>
+                                  <p:childTnLst>
+                                    <p:set>
+                                      <p:cBhvr>
+                                        <p:cTn id="10" dur="1" fill="hold">
+                                          <p:stCondLst>
+                                            <p:cond delay="0"/>
+                                          </p:stCondLst>
+                                        </p:cTn>
+                                        <p:tgtEl>
+                                          <p:spTgt spid="3">
+                                            <p:txEl>
+                                              <p:pRg st="1" end="1"/>
+                                            </p:txEl>
+                                          </p:spTgt>
+                                        </p:tgtEl>
+                                        <p:attrNameLst>
+                                          <p:attrName>style.visibility</p:attrName>
+                                        </p:attrNameLst>
+                                      </p:cBhvr>
+                                      <p:to>
+                                        <p:strVal val="visible"/>
+                                      </p:to>
+                                    </p:set>
+                                  </p:childTnLst>
+                                </p:cTn>
+                              </p:par>
+                            </p:childTnLst>
+                          </p:cTn>
+                        </p:par>
+                      </p:childTnLst>
+                    </p:cTn>
+                  </p:par>
+                  <p:par>
+                    <p:cTn id="11" fill="hold">
+                      <p:stCondLst>
+                        <p:cond delay="indefinite"/>
+                      </p:stCondLst>
+                      <p:childTnLst>
+                        <p:par>
+                          <p:cTn id="12" fill="hold">
+                            <p:stCondLst>
+                              <p:cond delay="0"/>
+                            </p:stCondLst>
+                            <p:childTnLst>
+                              <p:par>
+                                <p:cTn id="13" presetID="1" presetClass="entr" presetSubtype="0" fill="hold" nodeType="clickEffect">
+                                  <p:stCondLst>
+                                    <p:cond delay="0"/>
+                                  </p:stCondLst>
+                                  <p:childTnLst>
+                                    <p:set>
+                                      <p:cBhvr>
+                                        <p:cTn id="14" dur="1" fill="hold">
+                                          <p:stCondLst>
+                                            <p:cond delay="0"/>
+                                          </p:stCondLst>
+                                        </p:cTn>
+                                        <p:tgtEl>
+                                          <p:spTgt spid="3">
+                                            <p:txEl>
+                                              <p:pRg st="2" end="2"/>
+                                            </p:txEl>
+                                          </p:spTgt>
+                                        </p:tgtEl>
+                                        <p:attrNameLst>
+                                          <p:attrName>style.visibility</p:attrName>
+                                        </p:attrNameLst>
+                                      </p:cBhvr>
+                                      <p:to>
+                                        <p:strVal val="visible"/>
+                                      </p:to>
+                                    </p:set>
+                                  </p:childTnLst>
+                                </p:cTn>
+                              </p:par>
+                            </p:childTnLst>
+                          </p:cTn>
+                        </p:par>
+                      </p:childTnLst>
+                    </p:cTn>
+                  </p:par>
+                  <p:par>
+                    <p:cTn id="15" fill="hold">
+                      <p:stCondLst>
+                        <p:cond delay="indefinite"/>
+                      </p:stCondLst>
+                      <p:childTnLst>
+                        <p:par>
+                          <p:cTn id="16" fill="hold">
+                            <p:stCondLst>
+                              <p:cond delay="0"/>
+                            </p:stCondLst>
+                            <p:childTnLst>
+                              <p:par>
+                                <p:cTn id="17" presetID="1" presetClass="entr" presetSubtype="0" fill="hold" nodeType="clickEffect">
+                                  <p:stCondLst>
+                                    <p:cond delay="0"/>
+                                  </p:stCondLst>
+                                  <p:childTnLst>
+                                    <p:set>
+                                      <p:cBhvr>
+                                        <p:cTn id="18" dur="1" fill="hold">
+                                          <p:stCondLst>
+                                            <p:cond delay="0"/>
+                                          </p:stCondLst>
+                                        </p:cTn>
+                                        <p:tgtEl>
+                                          <p:spTgt spid="3">
+                                            <p:txEl>
+                                              <p:pRg st="3" end="3"/>
+                                            </p:txEl>
+                                          </p:spTgt>
+                                        </p:tgtEl>
+                                        <p:attrNameLst>
+                                          <p:attrName>style.visibility</p:attrName>
+                                        </p:attrNameLst>
+                                      </p:cBhvr>
+                                      <p:to>
+                                        <p:strVal val="visible"/>
+                                      </p:to>
+                                    </p:set>
+                                  </p:childTnLst>
+                                </p:cTn>
+                              </p:par>
+                            </p:childTnLst>
+                          </p:cTn>
+                        </p:par>
+                      </p:childTnLst>
+                    </p:cTn>
+                  </p:par>
+                  <p:par>
+                    <p:cTn id="19" fill="hold">
+                      <p:stCondLst>
+                        <p:cond delay="indefinite"/>
+                      </p:stCondLst>
+                      <p:childTnLst>
+                        <p:par>
+                          <p:cTn id="20" fill="hold">
+                            <p:stCondLst>
+                              <p:cond delay="0"/>
+                            </p:stCondLst>
+                            <p:childTnLst>
+                              <p:par>
+                                <p:cTn id="21" presetID="1" presetClass="entr" presetSubtype="0" fill="hold" nodeType="clickEffect">
+                                  <p:stCondLst>
+                                    <p:cond delay="0"/>
+                                  </p:stCondLst>
+                                  <p:childTnLst>
+                                    <p:set>
+                                      <p:cBhvr>
+                                        <p:cTn id="22" dur="1" fill="hold">
+                                          <p:stCondLst>
+                                            <p:cond delay="0"/>
+                                          </p:stCondLst>
+                                        </p:cTn>
+                                        <p:tgtEl>
+                                          <p:spTgt spid="3">
+                                            <p:txEl>
+                                              <p:pRg st="4" end="4"/>
+                                            </p:txEl>
+                                          </p:spTgt>
+                                        </p:tgtEl>
+                                        <p:attrNameLst>
+                                          <p:attrName>style.visibility</p:attrName>
+                                        </p:attrNameLst>
+                                      </p:cBhvr>
+                                      <p:to>
+                                        <p:strVal val="visible"/>
+                                      </p:to>
+                                    </p:set>
+                                  </p:childTnLst>
+                                </p:cTn>
+                              </p:par>
+                            </p:childTnLst>
+                          </p:cTn>
+                        </p:par>
+                      </p:childTnLst>
+                    </p:cTn>
+                  </p:par>
+                  <p:par>
+                    <p:cTn id="23" fill="hold">
+                      <p:stCondLst>
+                        <p:cond delay="indefinite"/>
+                      </p:stCondLst>
+                      <p:childTnLst>
+                        <p:par>
+                          <p:cTn id="24" fill="hold">
+                            <p:stCondLst>
+                              <p:cond delay="0"/>
+                            </p:stCondLst>
+                            <p:childTnLst>
+                              <p:par>
+                                <p:cTn id="25" presetID="1" presetClass="entr" presetSubtype="0" fill="hold" nodeType="clickEffect">
+                                  <p:stCondLst>
+                                    <p:cond delay="0"/>
+                                  </p:stCondLst>
+                                  <p:childTnLst>
+                                    <p:set>
+                                      <p:cBhvr>
+                                        <p:cTn id="26" dur="1" fill="hold">
+                                          <p:stCondLst>
+                                            <p:cond delay="0"/>
+                                          </p:stCondLst>
+                                        </p:cTn>
+                                        <p:tgtEl>
+                                          <p:spTgt spid="3">
+                                            <p:txEl>
+                                              <p:pRg st="5" end="5"/>
+                                            </p:txEl>
+                                          </p:spTgt>
+                                        </p:tgtEl>
+                                        <p:attrNameLst>
+                                          <p:attrName>style.visibility</p:attrName>
+                                        </p:attrNameLst>
+                                      </p:cBhvr>
+                                      <p:to>
+                                        <p:strVal val="visible"/>
+                                      </p:to>
+                                    </p:set>
+                                  </p:childTnLst>
+                                </p:cTn>
+                              </p:par>
+                            </p:childTnLst>
+                          </p:cTn>
+                        </p:par>
+                      </p:childTnLst>
+                    </p:cTn>
+                  </p:par>
+                  <p:par>
+                    <p:cTn id="27" fill="hold">
+                      <p:stCondLst>
+                        <p:cond delay="indefinite"/>
+                      </p:stCondLst>
+                      <p:childTnLst>
+                        <p:par>
+                          <p:cTn id="28" fill="hold">
+                            <p:stCondLst>
+                              <p:cond delay="0"/>
+                            </p:stCondLst>
+                            <p:childTnLst>
+                              <p:par>
+                                <p:cTn id="29" presetID="1" presetClass="entr" presetSubtype="0" fill="hold" nodeType="clickEffect">
+                                  <p:stCondLst>
+                                    <p:cond delay="0"/>
+                                  </p:stCondLst>
+                                  <p:childTnLst>
+                                    <p:set>
+                                      <p:cBhvr>
+                                        <p:cTn id="30" dur="1" fill="hold">
+                                          <p:stCondLst>
+                                            <p:cond delay="0"/>
+                                          </p:stCondLst>
+                                        </p:cTn>
+                                        <p:tgtEl>
+                                          <p:spTgt spid="3">
+                                            <p:txEl>
+                                              <p:pRg st="6" end="6"/>
+                                            </p:txEl>
+                                          </p:spTgt>
+                                        </p:tgtEl>
+                                        <p:attrNameLst>
+                                          <p:attrName>style.visibility</p:attrName>
+                                        </p:attrNameLst>
+                                      </p:cBhvr>
+                                      <p:to>
+                                        <p:strVal val="visible"/>
+                                      </p:to>
+                                    </p:set>
+                                  </p:childTnLst>
+                                </p:cTn>
+                              </p:par>
+                            </p:childTnLst>
+                          </p:cTn>
+                        </p:par>
+                      </p:childTnLst>
+                    </p:cTn>
+                  </p:par>
+                  <p:par>
+                    <p:cTn id="31" fill="hold">
+                      <p:stCondLst>
+                        <p:cond delay="indefinite"/>
+                      </p:stCondLst>
+                      <p:childTnLst>
+                        <p:par>
+                          <p:cTn id="32" fill="hold">
+                            <p:stCondLst>
+                              <p:cond delay="0"/>
+                            </p:stCondLst>
+                            <p:childTnLst>
+                              <p:par>
+                                <p:cTn id="33" presetID="1" presetClass="entr" presetSubtype="0" fill="hold" nodeType="clickEffect">
+                                  <p:stCondLst>
+                                    <p:cond delay="0"/>
+                                  </p:stCondLst>
+                                  <p:childTnLst>
+                                    <p:set>
+                                      <p:cBhvr>
+                                        <p:cTn id="34" dur="1" fill="hold">
+                                          <p:stCondLst>
+                                            <p:cond delay="0"/>
+                                          </p:stCondLst>
+                                        </p:cTn>
+                                        <p:tgtEl>
+                                          <p:spTgt spid="3">
+                                            <p:txEl>
+                                              <p:pRg st="7" end="7"/>
+                                            </p:txEl>
+                                          </p:spTgt>
+                                        </p:tgtEl>
+                                        <p:attrNameLst>
+                                          <p:attrName>style.visibility</p:attrName>
+                                        </p:attrNameLst>
+                                      </p:cBhvr>
+                                      <p:to>
+                                        <p:strVal val="visible"/>
+                                      </p:to>
+                                    </p:set>
+                                  </p:childTnLst>
+                                </p:cTn>
+                              </p:par>
+                            </p:childTnLst>
+                          </p:cTn>
+                        </p:par>
+                      </p:childTnLst>
+                    </p:cTn>
+                  </p:par>
+                </p:childTnLst>
+              </p:cTn>
+              <p:prevCondLst>
+                <p:cond evt="onPrev" delay="0">
+                  <p:tgtEl>
+                    <p:sldTgt/>
+                  </p:tgtEl>
+                </p:cond>
+              </p:prevCondLst>
+              <p:nextCondLst>
+                <p:cond evt="onNext" delay="0">
+                  <p:tgtEl>
+                    <p:sldTgt/>
+                  </p:tgtEl>
+                </p:cond>
+              </p:nextCondLst>
+            </p:seq>
+          </p:childTnLst>
+        </p:cTn>
       </p:par>
     </p:tnLst>
   </p:timing>
@@ -4763,10 +5370,9 @@
           <a:lstStyle/>
           <a:p>
             <a:r>
-              <a:rPr lang="pl-PL" dirty="0" smtClean="0"/>
+              <a:rPr lang="pl-PL" dirty="0"/>
               <a:t>Zapis algorytmu – lista kroków</a:t>
             </a:r>
-            <a:endParaRPr lang="pl-PL" dirty="0"/>
           </a:p>
         </p:txBody>
       </p:sp>
@@ -4790,7 +5396,7 @@
               <a:buAutoNum type="arabicPeriod"/>
             </a:pPr>
             <a:r>
-              <a:rPr lang="pl-PL" dirty="0" smtClean="0"/>
+              <a:rPr lang="pl-PL" dirty="0"/>
               <a:t>Pobieramy dane: a i b;</a:t>
             </a:r>
           </a:p>
@@ -4800,15 +5406,15 @@
               <a:buAutoNum type="arabicPeriod"/>
             </a:pPr>
             <a:r>
-              <a:rPr lang="pl-PL" dirty="0" smtClean="0"/>
+              <a:rPr lang="pl-PL" dirty="0"/>
               <a:t>Tworzymy zmienną </a:t>
             </a:r>
             <a:r>
-              <a:rPr lang="pl-PL" dirty="0" err="1" smtClean="0"/>
+              <a:rPr lang="pl-PL" dirty="0" err="1"/>
               <a:t>ap</a:t>
             </a:r>
             <a:r>
-              <a:rPr lang="pl-PL" dirty="0" smtClean="0"/>
+              <a:rPr lang="pl-PL" dirty="0"/>
               <a:t> := a</a:t>
             </a:r>
           </a:p>
@@ -4818,7 +5424,7 @@
               <a:buAutoNum type="arabicPeriod"/>
             </a:pPr>
             <a:r>
-              <a:rPr lang="pl-PL" dirty="0" smtClean="0"/>
+              <a:rPr lang="pl-PL" dirty="0"/>
               <a:t>Tworzymy zmienną bp := b</a:t>
             </a:r>
           </a:p>
@@ -4828,7 +5434,7 @@
               <a:buAutoNum type="arabicPeriod"/>
             </a:pPr>
             <a:r>
-              <a:rPr lang="pl-PL" dirty="0" smtClean="0"/>
+              <a:rPr lang="pl-PL" dirty="0"/>
               <a:t>Dopóki a różne od b, wykonuj:</a:t>
             </a:r>
           </a:p>
@@ -4838,22 +5444,22 @@
               <a:buAutoNum type="arabicPeriod"/>
             </a:pPr>
             <a:r>
-              <a:rPr lang="pl-PL" dirty="0" smtClean="0"/>
+              <a:rPr lang="pl-PL" dirty="0"/>
               <a:t>Jeżeli a &lt; b, to a := </a:t>
             </a:r>
             <a:r>
-              <a:rPr lang="pl-PL" dirty="0" err="1" smtClean="0"/>
+              <a:rPr lang="pl-PL" dirty="0" err="1"/>
               <a:t>a</a:t>
             </a:r>
             <a:r>
-              <a:rPr lang="pl-PL" dirty="0" smtClean="0"/>
+              <a:rPr lang="pl-PL" dirty="0"/>
               <a:t> + </a:t>
             </a:r>
             <a:r>
-              <a:rPr lang="pl-PL" dirty="0" err="1" smtClean="0"/>
+              <a:rPr lang="pl-PL" dirty="0" err="1"/>
               <a:t>ap</a:t>
             </a:r>
-            <a:endParaRPr lang="pl-PL" dirty="0" smtClean="0"/>
+            <a:endParaRPr lang="pl-PL" dirty="0"/>
           </a:p>
           <a:p>
             <a:pPr marL="811213" indent="-457200">
@@ -4861,15 +5467,15 @@
               <a:buAutoNum type="arabicPeriod"/>
             </a:pPr>
             <a:r>
-              <a:rPr lang="pl-PL" dirty="0" smtClean="0"/>
+              <a:rPr lang="pl-PL" dirty="0"/>
               <a:t>W przeciwnym wypadku b := </a:t>
             </a:r>
             <a:r>
-              <a:rPr lang="pl-PL" dirty="0" err="1" smtClean="0"/>
+              <a:rPr lang="pl-PL" dirty="0" err="1"/>
               <a:t>b</a:t>
             </a:r>
             <a:r>
-              <a:rPr lang="pl-PL" dirty="0" smtClean="0"/>
+              <a:rPr lang="pl-PL" dirty="0"/>
               <a:t> + bp</a:t>
             </a:r>
           </a:p>
@@ -4879,10 +5485,9 @@
               <a:buAutoNum type="arabicPeriod"/>
             </a:pPr>
             <a:r>
-              <a:rPr lang="pl-PL" dirty="0" smtClean="0"/>
+              <a:rPr lang="pl-PL" dirty="0"/>
               <a:t>Zwróć jako wynik a (lub b)</a:t>
             </a:r>
-            <a:endParaRPr lang="pl-PL" dirty="0"/>
           </a:p>
         </p:txBody>
       </p:sp>
@@ -4894,7 +5499,373 @@
   <p:timing>
     <p:tnLst>
       <p:par>
-        <p:cTn id="1" dur="indefinite" restart="never" nodeType="tmRoot"/>
+        <p:cTn id="1" dur="indefinite" restart="never" nodeType="tmRoot">
+          <p:childTnLst>
+            <p:seq concurrent="1" nextAc="seek">
+              <p:cTn id="2" dur="indefinite" nodeType="mainSeq">
+                <p:childTnLst>
+                  <p:par>
+                    <p:cTn id="3" fill="hold">
+                      <p:stCondLst>
+                        <p:cond delay="indefinite"/>
+                      </p:stCondLst>
+                      <p:childTnLst>
+                        <p:par>
+                          <p:cTn id="4" fill="hold">
+                            <p:stCondLst>
+                              <p:cond delay="0"/>
+                            </p:stCondLst>
+                            <p:childTnLst>
+                              <p:par>
+                                <p:cTn id="5" presetID="1" presetClass="entr" presetSubtype="0" fill="hold" nodeType="clickEffect">
+                                  <p:stCondLst>
+                                    <p:cond delay="0"/>
+                                  </p:stCondLst>
+                                  <p:childTnLst>
+                                    <p:set>
+                                      <p:cBhvr>
+                                        <p:cTn id="6" dur="1" fill="hold">
+                                          <p:stCondLst>
+                                            <p:cond delay="0"/>
+                                          </p:stCondLst>
+                                        </p:cTn>
+                                        <p:tgtEl>
+                                          <p:spTgt spid="3">
+                                            <p:txEl>
+                                              <p:pRg st="0" end="0"/>
+                                            </p:txEl>
+                                          </p:spTgt>
+                                        </p:tgtEl>
+                                        <p:attrNameLst>
+                                          <p:attrName>style.visibility</p:attrName>
+                                        </p:attrNameLst>
+                                      </p:cBhvr>
+                                      <p:to>
+                                        <p:strVal val="visible"/>
+                                      </p:to>
+                                    </p:set>
+                                  </p:childTnLst>
+                                </p:cTn>
+                              </p:par>
+                            </p:childTnLst>
+                          </p:cTn>
+                        </p:par>
+                      </p:childTnLst>
+                    </p:cTn>
+                  </p:par>
+                  <p:par>
+                    <p:cTn id="7" fill="hold">
+                      <p:stCondLst>
+                        <p:cond delay="indefinite"/>
+                      </p:stCondLst>
+                      <p:childTnLst>
+                        <p:par>
+                          <p:cTn id="8" fill="hold">
+                            <p:stCondLst>
+                              <p:cond delay="0"/>
+                            </p:stCondLst>
+                            <p:childTnLst>
+                              <p:par>
+                                <p:cTn id="9" presetID="1" presetClass="entr" presetSubtype="0" fill="hold" nodeType="clickEffect">
+                                  <p:stCondLst>
+                                    <p:cond delay="0"/>
+                                  </p:stCondLst>
+                                  <p:childTnLst>
+                                    <p:set>
+                                      <p:cBhvr>
+                                        <p:cTn id="10" dur="1" fill="hold">
+                                          <p:stCondLst>
+                                            <p:cond delay="0"/>
+                                          </p:stCondLst>
+                                        </p:cTn>
+                                        <p:tgtEl>
+                                          <p:spTgt spid="3">
+                                            <p:txEl>
+                                              <p:pRg st="1" end="1"/>
+                                            </p:txEl>
+                                          </p:spTgt>
+                                        </p:tgtEl>
+                                        <p:attrNameLst>
+                                          <p:attrName>style.visibility</p:attrName>
+                                        </p:attrNameLst>
+                                      </p:cBhvr>
+                                      <p:to>
+                                        <p:strVal val="visible"/>
+                                      </p:to>
+                                    </p:set>
+                                  </p:childTnLst>
+                                </p:cTn>
+                              </p:par>
+                            </p:childTnLst>
+                          </p:cTn>
+                        </p:par>
+                      </p:childTnLst>
+                    </p:cTn>
+                  </p:par>
+                  <p:par>
+                    <p:cTn id="11" fill="hold">
+                      <p:stCondLst>
+                        <p:cond delay="indefinite"/>
+                      </p:stCondLst>
+                      <p:childTnLst>
+                        <p:par>
+                          <p:cTn id="12" fill="hold">
+                            <p:stCondLst>
+                              <p:cond delay="0"/>
+                            </p:stCondLst>
+                            <p:childTnLst>
+                              <p:par>
+                                <p:cTn id="13" presetID="1" presetClass="entr" presetSubtype="0" fill="hold" nodeType="clickEffect">
+                                  <p:stCondLst>
+                                    <p:cond delay="0"/>
+                                  </p:stCondLst>
+                                  <p:childTnLst>
+                                    <p:set>
+                                      <p:cBhvr>
+                                        <p:cTn id="14" dur="1" fill="hold">
+                                          <p:stCondLst>
+                                            <p:cond delay="0"/>
+                                          </p:stCondLst>
+                                        </p:cTn>
+                                        <p:tgtEl>
+                                          <p:spTgt spid="3">
+                                            <p:txEl>
+                                              <p:pRg st="2" end="2"/>
+                                            </p:txEl>
+                                          </p:spTgt>
+                                        </p:tgtEl>
+                                        <p:attrNameLst>
+                                          <p:attrName>style.visibility</p:attrName>
+                                        </p:attrNameLst>
+                                      </p:cBhvr>
+                                      <p:to>
+                                        <p:strVal val="visible"/>
+                                      </p:to>
+                                    </p:set>
+                                  </p:childTnLst>
+                                </p:cTn>
+                              </p:par>
+                            </p:childTnLst>
+                          </p:cTn>
+                        </p:par>
+                      </p:childTnLst>
+                    </p:cTn>
+                  </p:par>
+                  <p:par>
+                    <p:cTn id="15" fill="hold">
+                      <p:stCondLst>
+                        <p:cond delay="indefinite"/>
+                      </p:stCondLst>
+                      <p:childTnLst>
+                        <p:par>
+                          <p:cTn id="16" fill="hold">
+                            <p:stCondLst>
+                              <p:cond delay="0"/>
+                            </p:stCondLst>
+                            <p:childTnLst>
+                              <p:par>
+                                <p:cTn id="17" presetID="1" presetClass="entr" presetSubtype="0" fill="hold" nodeType="clickEffect">
+                                  <p:stCondLst>
+                                    <p:cond delay="0"/>
+                                  </p:stCondLst>
+                                  <p:childTnLst>
+                                    <p:set>
+                                      <p:cBhvr>
+                                        <p:cTn id="18" dur="1" fill="hold">
+                                          <p:stCondLst>
+                                            <p:cond delay="0"/>
+                                          </p:stCondLst>
+                                        </p:cTn>
+                                        <p:tgtEl>
+                                          <p:spTgt spid="3">
+                                            <p:txEl>
+                                              <p:pRg st="3" end="3"/>
+                                            </p:txEl>
+                                          </p:spTgt>
+                                        </p:tgtEl>
+                                        <p:attrNameLst>
+                                          <p:attrName>style.visibility</p:attrName>
+                                        </p:attrNameLst>
+                                      </p:cBhvr>
+                                      <p:to>
+                                        <p:strVal val="visible"/>
+                                      </p:to>
+                                    </p:set>
+                                  </p:childTnLst>
+                                </p:cTn>
+                              </p:par>
+                            </p:childTnLst>
+                          </p:cTn>
+                        </p:par>
+                      </p:childTnLst>
+                    </p:cTn>
+                  </p:par>
+                  <p:par>
+                    <p:cTn id="19" fill="hold">
+                      <p:stCondLst>
+                        <p:cond delay="indefinite"/>
+                      </p:stCondLst>
+                      <p:childTnLst>
+                        <p:par>
+                          <p:cTn id="20" fill="hold">
+                            <p:stCondLst>
+                              <p:cond delay="0"/>
+                            </p:stCondLst>
+                            <p:childTnLst>
+                              <p:par>
+                                <p:cTn id="21" presetID="1" presetClass="entr" presetSubtype="0" fill="hold" nodeType="clickEffect">
+                                  <p:stCondLst>
+                                    <p:cond delay="0"/>
+                                  </p:stCondLst>
+                                  <p:childTnLst>
+                                    <p:set>
+                                      <p:cBhvr>
+                                        <p:cTn id="22" dur="1" fill="hold">
+                                          <p:stCondLst>
+                                            <p:cond delay="0"/>
+                                          </p:stCondLst>
+                                        </p:cTn>
+                                        <p:tgtEl>
+                                          <p:spTgt spid="3">
+                                            <p:txEl>
+                                              <p:pRg st="4" end="4"/>
+                                            </p:txEl>
+                                          </p:spTgt>
+                                        </p:tgtEl>
+                                        <p:attrNameLst>
+                                          <p:attrName>style.visibility</p:attrName>
+                                        </p:attrNameLst>
+                                      </p:cBhvr>
+                                      <p:to>
+                                        <p:strVal val="visible"/>
+                                      </p:to>
+                                    </p:set>
+                                  </p:childTnLst>
+                                </p:cTn>
+                              </p:par>
+                            </p:childTnLst>
+                          </p:cTn>
+                        </p:par>
+                      </p:childTnLst>
+                    </p:cTn>
+                  </p:par>
+                  <p:par>
+                    <p:cTn id="23" fill="hold">
+                      <p:stCondLst>
+                        <p:cond delay="indefinite"/>
+                      </p:stCondLst>
+                      <p:childTnLst>
+                        <p:par>
+                          <p:cTn id="24" fill="hold">
+                            <p:stCondLst>
+                              <p:cond delay="0"/>
+                            </p:stCondLst>
+                            <p:childTnLst>
+                              <p:par>
+                                <p:cTn id="25" presetID="1" presetClass="entr" presetSubtype="0" fill="hold" nodeType="clickEffect">
+                                  <p:stCondLst>
+                                    <p:cond delay="0"/>
+                                  </p:stCondLst>
+                                  <p:childTnLst>
+                                    <p:set>
+                                      <p:cBhvr>
+                                        <p:cTn id="26" dur="1" fill="hold">
+                                          <p:stCondLst>
+                                            <p:cond delay="0"/>
+                                          </p:stCondLst>
+                                        </p:cTn>
+                                        <p:tgtEl>
+                                          <p:spTgt spid="3">
+                                            <p:txEl>
+                                              <p:pRg st="5" end="5"/>
+                                            </p:txEl>
+                                          </p:spTgt>
+                                        </p:tgtEl>
+                                        <p:attrNameLst>
+                                          <p:attrName>style.visibility</p:attrName>
+                                        </p:attrNameLst>
+                                      </p:cBhvr>
+                                      <p:to>
+                                        <p:strVal val="visible"/>
+                                      </p:to>
+                                    </p:set>
+                                  </p:childTnLst>
+                                </p:cTn>
+                              </p:par>
+                            </p:childTnLst>
+                          </p:cTn>
+                        </p:par>
+                      </p:childTnLst>
+                    </p:cTn>
+                  </p:par>
+                  <p:par>
+                    <p:cTn id="27" fill="hold">
+                      <p:stCondLst>
+                        <p:cond delay="indefinite"/>
+                      </p:stCondLst>
+                      <p:childTnLst>
+                        <p:par>
+                          <p:cTn id="28" fill="hold">
+                            <p:stCondLst>
+                              <p:cond delay="0"/>
+                            </p:stCondLst>
+                            <p:childTnLst>
+                              <p:par>
+                                <p:cTn id="29" presetID="1" presetClass="entr" presetSubtype="0" fill="hold" nodeType="clickEffect">
+                                  <p:stCondLst>
+                                    <p:cond delay="0"/>
+                                  </p:stCondLst>
+                                  <p:childTnLst>
+                                    <p:set>
+                                      <p:cBhvr>
+                                        <p:cTn id="30" dur="1" fill="hold">
+                                          <p:stCondLst>
+                                            <p:cond delay="0"/>
+                                          </p:stCondLst>
+                                        </p:cTn>
+                                        <p:tgtEl>
+                                          <p:spTgt spid="3">
+                                            <p:txEl>
+                                              <p:pRg st="6" end="6"/>
+                                            </p:txEl>
+                                          </p:spTgt>
+                                        </p:tgtEl>
+                                        <p:attrNameLst>
+                                          <p:attrName>style.visibility</p:attrName>
+                                        </p:attrNameLst>
+                                      </p:cBhvr>
+                                      <p:to>
+                                        <p:strVal val="visible"/>
+                                      </p:to>
+                                    </p:set>
+                                  </p:childTnLst>
+                                </p:cTn>
+                              </p:par>
+                            </p:childTnLst>
+                          </p:cTn>
+                        </p:par>
+                      </p:childTnLst>
+                    </p:cTn>
+                  </p:par>
+                </p:childTnLst>
+              </p:cTn>
+              <p:prevCondLst>
+                <p:cond evt="onPrev" delay="0">
+                  <p:tgtEl>
+                    <p:sldTgt/>
+                  </p:tgtEl>
+                </p:cond>
+              </p:prevCondLst>
+              <p:nextCondLst>
+                <p:cond evt="onNext" delay="0">
+                  <p:tgtEl>
+                    <p:sldTgt/>
+                  </p:tgtEl>
+                </p:cond>
+              </p:nextCondLst>
+            </p:seq>
+          </p:childTnLst>
+        </p:cTn>
       </p:par>
     </p:tnLst>
   </p:timing>
@@ -4923,7 +5894,7 @@
           <p:cNvPr id="2" name="Tytuł 1">
             <a:extLst>
               <a:ext uri="{FF2B5EF4-FFF2-40B4-BE49-F238E27FC236}">
-                <a16:creationId xmlns:a16="http://schemas.microsoft.com/office/drawing/2014/main" xmlns="" id="{8073ACDB-AFB9-45E6-BFDE-95A7AAE97E57}"/>
+                <a16:creationId xmlns:a16="http://schemas.microsoft.com/office/drawing/2014/main" id="{8073ACDB-AFB9-45E6-BFDE-95A7AAE97E57}"/>
               </a:ext>
             </a:extLst>
           </p:cNvPr>
@@ -4946,8 +5917,8 @@
           </a:p>
         </p:txBody>
       </p:sp>
-      <mc:AlternateContent xmlns:mc="http://schemas.openxmlformats.org/markup-compatibility/2006">
-        <mc:Choice xmlns:a14="http://schemas.microsoft.com/office/drawing/2010/main" xmlns="" Requires="a14">
+      <mc:AlternateContent xmlns:mc="http://schemas.openxmlformats.org/markup-compatibility/2006" xmlns:a14="http://schemas.microsoft.com/office/drawing/2010/main">
+        <mc:Choice Requires="a14">
           <p:sp>
             <p:nvSpPr>
               <p:cNvPr id="3" name="Symbol zastępczy zawartości 2">
@@ -5136,17 +6107,10 @@
                     <a:latin typeface="Consolas" panose="020B0609020204030204" pitchFamily="49" charset="0"/>
                     <a:cs typeface="Consolas" panose="020B0609020204030204" pitchFamily="49" charset="0"/>
                   </a:rPr>
-                  <a:t>liczba1_</a:t>
+                  <a:t>liczba1_nww</a:t>
                 </a:r>
                 <a:r>
-                  <a:rPr lang="pl-PL" i="1">
-                    <a:latin typeface="Consolas" panose="020B0609020204030204" pitchFamily="49" charset="0"/>
-                    <a:cs typeface="Consolas" panose="020B0609020204030204" pitchFamily="49" charset="0"/>
-                  </a:rPr>
-                  <a:t>nww</a:t>
-                </a:r>
-                <a:r>
-                  <a:rPr lang="pl-PL">
+                  <a:rPr lang="pl-PL" dirty="0">
                     <a:latin typeface="Consolas" panose="020B0609020204030204" pitchFamily="49" charset="0"/>
                     <a:cs typeface="Consolas" panose="020B0609020204030204" pitchFamily="49" charset="0"/>
                   </a:rPr>
@@ -5326,7 +6290,7 @@
             </p:txBody>
           </p:sp>
         </mc:Choice>
-        <mc:Fallback>
+        <mc:Fallback xmlns="">
           <p:sp>
             <p:nvSpPr>
               <p:cNvPr id="3" name="Symbol zastępczy zawartości 2">
@@ -5369,7 +6333,7 @@
     </p:spTree>
     <p:extLst>
       <p:ext uri="{BB962C8B-B14F-4D97-AF65-F5344CB8AC3E}">
-        <p14:creationId xmlns:p14="http://schemas.microsoft.com/office/powerpoint/2010/main" xmlns="" val="4199663037"/>
+        <p14:creationId xmlns:p14="http://schemas.microsoft.com/office/powerpoint/2010/main" val="4199663037"/>
       </p:ext>
     </p:extLst>
   </p:cSld>
@@ -5379,7 +6343,471 @@
   <p:timing>
     <p:tnLst>
       <p:par>
-        <p:cTn id="1" dur="indefinite" restart="never" nodeType="tmRoot"/>
+        <p:cTn id="1" dur="indefinite" restart="never" nodeType="tmRoot">
+          <p:childTnLst>
+            <p:seq concurrent="1" nextAc="seek">
+              <p:cTn id="2" dur="indefinite" nodeType="mainSeq">
+                <p:childTnLst>
+                  <p:par>
+                    <p:cTn id="3" fill="hold">
+                      <p:stCondLst>
+                        <p:cond delay="indefinite"/>
+                      </p:stCondLst>
+                      <p:childTnLst>
+                        <p:par>
+                          <p:cTn id="4" fill="hold">
+                            <p:stCondLst>
+                              <p:cond delay="0"/>
+                            </p:stCondLst>
+                            <p:childTnLst>
+                              <p:par>
+                                <p:cTn id="5" presetID="1" presetClass="entr" presetSubtype="0" fill="hold" nodeType="clickEffect">
+                                  <p:stCondLst>
+                                    <p:cond delay="0"/>
+                                  </p:stCondLst>
+                                  <p:childTnLst>
+                                    <p:set>
+                                      <p:cBhvr>
+                                        <p:cTn id="6" dur="1" fill="hold">
+                                          <p:stCondLst>
+                                            <p:cond delay="0"/>
+                                          </p:stCondLst>
+                                        </p:cTn>
+                                        <p:tgtEl>
+                                          <p:spTgt spid="3">
+                                            <p:txEl>
+                                              <p:pRg st="0" end="0"/>
+                                            </p:txEl>
+                                          </p:spTgt>
+                                        </p:tgtEl>
+                                        <p:attrNameLst>
+                                          <p:attrName>style.visibility</p:attrName>
+                                        </p:attrNameLst>
+                                      </p:cBhvr>
+                                      <p:to>
+                                        <p:strVal val="visible"/>
+                                      </p:to>
+                                    </p:set>
+                                  </p:childTnLst>
+                                </p:cTn>
+                              </p:par>
+                            </p:childTnLst>
+                          </p:cTn>
+                        </p:par>
+                      </p:childTnLst>
+                    </p:cTn>
+                  </p:par>
+                  <p:par>
+                    <p:cTn id="7" fill="hold">
+                      <p:stCondLst>
+                        <p:cond delay="indefinite"/>
+                      </p:stCondLst>
+                      <p:childTnLst>
+                        <p:par>
+                          <p:cTn id="8" fill="hold">
+                            <p:stCondLst>
+                              <p:cond delay="0"/>
+                            </p:stCondLst>
+                            <p:childTnLst>
+                              <p:par>
+                                <p:cTn id="9" presetID="1" presetClass="entr" presetSubtype="0" fill="hold" nodeType="clickEffect">
+                                  <p:stCondLst>
+                                    <p:cond delay="0"/>
+                                  </p:stCondLst>
+                                  <p:childTnLst>
+                                    <p:set>
+                                      <p:cBhvr>
+                                        <p:cTn id="10" dur="1" fill="hold">
+                                          <p:stCondLst>
+                                            <p:cond delay="0"/>
+                                          </p:stCondLst>
+                                        </p:cTn>
+                                        <p:tgtEl>
+                                          <p:spTgt spid="3">
+                                            <p:txEl>
+                                              <p:pRg st="1" end="1"/>
+                                            </p:txEl>
+                                          </p:spTgt>
+                                        </p:tgtEl>
+                                        <p:attrNameLst>
+                                          <p:attrName>style.visibility</p:attrName>
+                                        </p:attrNameLst>
+                                      </p:cBhvr>
+                                      <p:to>
+                                        <p:strVal val="visible"/>
+                                      </p:to>
+                                    </p:set>
+                                  </p:childTnLst>
+                                </p:cTn>
+                              </p:par>
+                            </p:childTnLst>
+                          </p:cTn>
+                        </p:par>
+                      </p:childTnLst>
+                    </p:cTn>
+                  </p:par>
+                  <p:par>
+                    <p:cTn id="11" fill="hold">
+                      <p:stCondLst>
+                        <p:cond delay="indefinite"/>
+                      </p:stCondLst>
+                      <p:childTnLst>
+                        <p:par>
+                          <p:cTn id="12" fill="hold">
+                            <p:stCondLst>
+                              <p:cond delay="0"/>
+                            </p:stCondLst>
+                            <p:childTnLst>
+                              <p:par>
+                                <p:cTn id="13" presetID="1" presetClass="entr" presetSubtype="0" fill="hold" nodeType="clickEffect">
+                                  <p:stCondLst>
+                                    <p:cond delay="0"/>
+                                  </p:stCondLst>
+                                  <p:childTnLst>
+                                    <p:set>
+                                      <p:cBhvr>
+                                        <p:cTn id="14" dur="1" fill="hold">
+                                          <p:stCondLst>
+                                            <p:cond delay="0"/>
+                                          </p:stCondLst>
+                                        </p:cTn>
+                                        <p:tgtEl>
+                                          <p:spTgt spid="3">
+                                            <p:txEl>
+                                              <p:pRg st="2" end="2"/>
+                                            </p:txEl>
+                                          </p:spTgt>
+                                        </p:tgtEl>
+                                        <p:attrNameLst>
+                                          <p:attrName>style.visibility</p:attrName>
+                                        </p:attrNameLst>
+                                      </p:cBhvr>
+                                      <p:to>
+                                        <p:strVal val="visible"/>
+                                      </p:to>
+                                    </p:set>
+                                  </p:childTnLst>
+                                </p:cTn>
+                              </p:par>
+                            </p:childTnLst>
+                          </p:cTn>
+                        </p:par>
+                      </p:childTnLst>
+                    </p:cTn>
+                  </p:par>
+                  <p:par>
+                    <p:cTn id="15" fill="hold">
+                      <p:stCondLst>
+                        <p:cond delay="indefinite"/>
+                      </p:stCondLst>
+                      <p:childTnLst>
+                        <p:par>
+                          <p:cTn id="16" fill="hold">
+                            <p:stCondLst>
+                              <p:cond delay="0"/>
+                            </p:stCondLst>
+                            <p:childTnLst>
+                              <p:par>
+                                <p:cTn id="17" presetID="1" presetClass="entr" presetSubtype="0" fill="hold" nodeType="clickEffect">
+                                  <p:stCondLst>
+                                    <p:cond delay="0"/>
+                                  </p:stCondLst>
+                                  <p:childTnLst>
+                                    <p:set>
+                                      <p:cBhvr>
+                                        <p:cTn id="18" dur="1" fill="hold">
+                                          <p:stCondLst>
+                                            <p:cond delay="0"/>
+                                          </p:stCondLst>
+                                        </p:cTn>
+                                        <p:tgtEl>
+                                          <p:spTgt spid="3">
+                                            <p:txEl>
+                                              <p:pRg st="3" end="3"/>
+                                            </p:txEl>
+                                          </p:spTgt>
+                                        </p:tgtEl>
+                                        <p:attrNameLst>
+                                          <p:attrName>style.visibility</p:attrName>
+                                        </p:attrNameLst>
+                                      </p:cBhvr>
+                                      <p:to>
+                                        <p:strVal val="visible"/>
+                                      </p:to>
+                                    </p:set>
+                                  </p:childTnLst>
+                                </p:cTn>
+                              </p:par>
+                            </p:childTnLst>
+                          </p:cTn>
+                        </p:par>
+                      </p:childTnLst>
+                    </p:cTn>
+                  </p:par>
+                  <p:par>
+                    <p:cTn id="19" fill="hold">
+                      <p:stCondLst>
+                        <p:cond delay="indefinite"/>
+                      </p:stCondLst>
+                      <p:childTnLst>
+                        <p:par>
+                          <p:cTn id="20" fill="hold">
+                            <p:stCondLst>
+                              <p:cond delay="0"/>
+                            </p:stCondLst>
+                            <p:childTnLst>
+                              <p:par>
+                                <p:cTn id="21" presetID="1" presetClass="entr" presetSubtype="0" fill="hold" nodeType="clickEffect">
+                                  <p:stCondLst>
+                                    <p:cond delay="0"/>
+                                  </p:stCondLst>
+                                  <p:childTnLst>
+                                    <p:set>
+                                      <p:cBhvr>
+                                        <p:cTn id="22" dur="1" fill="hold">
+                                          <p:stCondLst>
+                                            <p:cond delay="0"/>
+                                          </p:stCondLst>
+                                        </p:cTn>
+                                        <p:tgtEl>
+                                          <p:spTgt spid="3">
+                                            <p:txEl>
+                                              <p:pRg st="4" end="4"/>
+                                            </p:txEl>
+                                          </p:spTgt>
+                                        </p:tgtEl>
+                                        <p:attrNameLst>
+                                          <p:attrName>style.visibility</p:attrName>
+                                        </p:attrNameLst>
+                                      </p:cBhvr>
+                                      <p:to>
+                                        <p:strVal val="visible"/>
+                                      </p:to>
+                                    </p:set>
+                                  </p:childTnLst>
+                                </p:cTn>
+                              </p:par>
+                            </p:childTnLst>
+                          </p:cTn>
+                        </p:par>
+                      </p:childTnLst>
+                    </p:cTn>
+                  </p:par>
+                  <p:par>
+                    <p:cTn id="23" fill="hold">
+                      <p:stCondLst>
+                        <p:cond delay="indefinite"/>
+                      </p:stCondLst>
+                      <p:childTnLst>
+                        <p:par>
+                          <p:cTn id="24" fill="hold">
+                            <p:stCondLst>
+                              <p:cond delay="0"/>
+                            </p:stCondLst>
+                            <p:childTnLst>
+                              <p:par>
+                                <p:cTn id="25" presetID="1" presetClass="entr" presetSubtype="0" fill="hold" nodeType="clickEffect">
+                                  <p:stCondLst>
+                                    <p:cond delay="0"/>
+                                  </p:stCondLst>
+                                  <p:childTnLst>
+                                    <p:set>
+                                      <p:cBhvr>
+                                        <p:cTn id="26" dur="1" fill="hold">
+                                          <p:stCondLst>
+                                            <p:cond delay="0"/>
+                                          </p:stCondLst>
+                                        </p:cTn>
+                                        <p:tgtEl>
+                                          <p:spTgt spid="3">
+                                            <p:txEl>
+                                              <p:pRg st="5" end="5"/>
+                                            </p:txEl>
+                                          </p:spTgt>
+                                        </p:tgtEl>
+                                        <p:attrNameLst>
+                                          <p:attrName>style.visibility</p:attrName>
+                                        </p:attrNameLst>
+                                      </p:cBhvr>
+                                      <p:to>
+                                        <p:strVal val="visible"/>
+                                      </p:to>
+                                    </p:set>
+                                  </p:childTnLst>
+                                </p:cTn>
+                              </p:par>
+                            </p:childTnLst>
+                          </p:cTn>
+                        </p:par>
+                      </p:childTnLst>
+                    </p:cTn>
+                  </p:par>
+                  <p:par>
+                    <p:cTn id="27" fill="hold">
+                      <p:stCondLst>
+                        <p:cond delay="indefinite"/>
+                      </p:stCondLst>
+                      <p:childTnLst>
+                        <p:par>
+                          <p:cTn id="28" fill="hold">
+                            <p:stCondLst>
+                              <p:cond delay="0"/>
+                            </p:stCondLst>
+                            <p:childTnLst>
+                              <p:par>
+                                <p:cTn id="29" presetID="1" presetClass="entr" presetSubtype="0" fill="hold" nodeType="clickEffect">
+                                  <p:stCondLst>
+                                    <p:cond delay="0"/>
+                                  </p:stCondLst>
+                                  <p:childTnLst>
+                                    <p:set>
+                                      <p:cBhvr>
+                                        <p:cTn id="30" dur="1" fill="hold">
+                                          <p:stCondLst>
+                                            <p:cond delay="0"/>
+                                          </p:stCondLst>
+                                        </p:cTn>
+                                        <p:tgtEl>
+                                          <p:spTgt spid="3">
+                                            <p:txEl>
+                                              <p:pRg st="6" end="6"/>
+                                            </p:txEl>
+                                          </p:spTgt>
+                                        </p:tgtEl>
+                                        <p:attrNameLst>
+                                          <p:attrName>style.visibility</p:attrName>
+                                        </p:attrNameLst>
+                                      </p:cBhvr>
+                                      <p:to>
+                                        <p:strVal val="visible"/>
+                                      </p:to>
+                                    </p:set>
+                                  </p:childTnLst>
+                                </p:cTn>
+                              </p:par>
+                            </p:childTnLst>
+                          </p:cTn>
+                        </p:par>
+                      </p:childTnLst>
+                    </p:cTn>
+                  </p:par>
+                  <p:par>
+                    <p:cTn id="31" fill="hold">
+                      <p:stCondLst>
+                        <p:cond delay="indefinite"/>
+                      </p:stCondLst>
+                      <p:childTnLst>
+                        <p:par>
+                          <p:cTn id="32" fill="hold">
+                            <p:stCondLst>
+                              <p:cond delay="0"/>
+                            </p:stCondLst>
+                            <p:childTnLst>
+                              <p:par>
+                                <p:cTn id="33" presetID="1" presetClass="entr" presetSubtype="0" fill="hold" nodeType="clickEffect">
+                                  <p:stCondLst>
+                                    <p:cond delay="0"/>
+                                  </p:stCondLst>
+                                  <p:childTnLst>
+                                    <p:set>
+                                      <p:cBhvr>
+                                        <p:cTn id="34" dur="1" fill="hold">
+                                          <p:stCondLst>
+                                            <p:cond delay="0"/>
+                                          </p:stCondLst>
+                                        </p:cTn>
+                                        <p:tgtEl>
+                                          <p:spTgt spid="3">
+                                            <p:txEl>
+                                              <p:pRg st="7" end="7"/>
+                                            </p:txEl>
+                                          </p:spTgt>
+                                        </p:tgtEl>
+                                        <p:attrNameLst>
+                                          <p:attrName>style.visibility</p:attrName>
+                                        </p:attrNameLst>
+                                      </p:cBhvr>
+                                      <p:to>
+                                        <p:strVal val="visible"/>
+                                      </p:to>
+                                    </p:set>
+                                  </p:childTnLst>
+                                </p:cTn>
+                              </p:par>
+                            </p:childTnLst>
+                          </p:cTn>
+                        </p:par>
+                      </p:childTnLst>
+                    </p:cTn>
+                  </p:par>
+                  <p:par>
+                    <p:cTn id="35" fill="hold">
+                      <p:stCondLst>
+                        <p:cond delay="indefinite"/>
+                      </p:stCondLst>
+                      <p:childTnLst>
+                        <p:par>
+                          <p:cTn id="36" fill="hold">
+                            <p:stCondLst>
+                              <p:cond delay="0"/>
+                            </p:stCondLst>
+                            <p:childTnLst>
+                              <p:par>
+                                <p:cTn id="37" presetID="1" presetClass="entr" presetSubtype="0" fill="hold" nodeType="clickEffect">
+                                  <p:stCondLst>
+                                    <p:cond delay="0"/>
+                                  </p:stCondLst>
+                                  <p:childTnLst>
+                                    <p:set>
+                                      <p:cBhvr>
+                                        <p:cTn id="38" dur="1" fill="hold">
+                                          <p:stCondLst>
+                                            <p:cond delay="0"/>
+                                          </p:stCondLst>
+                                        </p:cTn>
+                                        <p:tgtEl>
+                                          <p:spTgt spid="3">
+                                            <p:txEl>
+                                              <p:pRg st="8" end="8"/>
+                                            </p:txEl>
+                                          </p:spTgt>
+                                        </p:tgtEl>
+                                        <p:attrNameLst>
+                                          <p:attrName>style.visibility</p:attrName>
+                                        </p:attrNameLst>
+                                      </p:cBhvr>
+                                      <p:to>
+                                        <p:strVal val="visible"/>
+                                      </p:to>
+                                    </p:set>
+                                  </p:childTnLst>
+                                </p:cTn>
+                              </p:par>
+                            </p:childTnLst>
+                          </p:cTn>
+                        </p:par>
+                      </p:childTnLst>
+                    </p:cTn>
+                  </p:par>
+                </p:childTnLst>
+              </p:cTn>
+              <p:prevCondLst>
+                <p:cond evt="onPrev" delay="0">
+                  <p:tgtEl>
+                    <p:sldTgt/>
+                  </p:tgtEl>
+                </p:cond>
+              </p:prevCondLst>
+              <p:nextCondLst>
+                <p:cond evt="onNext" delay="0">
+                  <p:tgtEl>
+                    <p:sldTgt/>
+                  </p:tgtEl>
+                </p:cond>
+              </p:nextCondLst>
+            </p:seq>
+          </p:childTnLst>
+        </p:cTn>
       </p:par>
     </p:tnLst>
   </p:timing>
@@ -5408,7 +6836,7 @@
           <p:cNvPr id="2" name="Tytuł 1">
             <a:extLst>
               <a:ext uri="{FF2B5EF4-FFF2-40B4-BE49-F238E27FC236}">
-                <a16:creationId xmlns:a16="http://schemas.microsoft.com/office/drawing/2014/main" xmlns="" id="{46AD7D5D-9A2C-3B45-8A37-E2D0840C7E1B}"/>
+                <a16:creationId xmlns:a16="http://schemas.microsoft.com/office/drawing/2014/main" id="{46AD7D5D-9A2C-3B45-8A37-E2D0840C7E1B}"/>
               </a:ext>
             </a:extLst>
           </p:cNvPr>
@@ -5436,7 +6864,7 @@
           <p:cNvPr id="3" name="Podtytuł 2">
             <a:extLst>
               <a:ext uri="{FF2B5EF4-FFF2-40B4-BE49-F238E27FC236}">
-                <a16:creationId xmlns:a16="http://schemas.microsoft.com/office/drawing/2014/main" xmlns="" id="{31C8217C-A618-6A4A-85C1-84C2AFB2490F}"/>
+                <a16:creationId xmlns:a16="http://schemas.microsoft.com/office/drawing/2014/main" id="{31C8217C-A618-6A4A-85C1-84C2AFB2490F}"/>
               </a:ext>
             </a:extLst>
           </p:cNvPr>
@@ -5462,20 +6890,13 @@
     </p:spTree>
     <p:extLst>
       <p:ext uri="{BB962C8B-B14F-4D97-AF65-F5344CB8AC3E}">
-        <p14:creationId xmlns:p14="http://schemas.microsoft.com/office/powerpoint/2010/main" xmlns="" val="1311987472"/>
+        <p14:creationId xmlns:p14="http://schemas.microsoft.com/office/powerpoint/2010/main" val="1311987472"/>
       </p:ext>
     </p:extLst>
   </p:cSld>
   <p:clrMapOvr>
     <a:masterClrMapping/>
   </p:clrMapOvr>
-  <p:timing>
-    <p:tnLst>
-      <p:par>
-        <p:cTn id="1" dur="indefinite" restart="never" nodeType="tmRoot"/>
-      </p:par>
-    </p:tnLst>
-  </p:timing>
 </p:sld>
 </file>
 
@@ -5501,7 +6922,7 @@
           <p:cNvPr id="2" name="Tytuł 1">
             <a:extLst>
               <a:ext uri="{FF2B5EF4-FFF2-40B4-BE49-F238E27FC236}">
-                <a16:creationId xmlns:a16="http://schemas.microsoft.com/office/drawing/2014/main" xmlns="" id="{D99ABC43-81A0-E14F-BE59-89EC58A92B6E}"/>
+                <a16:creationId xmlns:a16="http://schemas.microsoft.com/office/drawing/2014/main" id="{D99ABC43-81A0-E14F-BE59-89EC58A92B6E}"/>
               </a:ext>
             </a:extLst>
           </p:cNvPr>
@@ -5529,7 +6950,7 @@
           <p:cNvPr id="3" name="Symbol zastępczy zawartości 2">
             <a:extLst>
               <a:ext uri="{FF2B5EF4-FFF2-40B4-BE49-F238E27FC236}">
-                <a16:creationId xmlns:a16="http://schemas.microsoft.com/office/drawing/2014/main" xmlns="" id="{D583B86E-D1A9-244D-BCE1-DCD5F14D2236}"/>
+                <a16:creationId xmlns:a16="http://schemas.microsoft.com/office/drawing/2014/main" id="{D583B86E-D1A9-244D-BCE1-DCD5F14D2236}"/>
               </a:ext>
             </a:extLst>
           </p:cNvPr>
@@ -5551,14 +6972,14 @@
               <a:buNone/>
             </a:pPr>
             <a:r>
-              <a:rPr lang="pl-PL" sz="2400" b="1" dirty="0"/>
+              <a:rPr lang="pl-PL" sz="3200" b="1" dirty="0"/>
               <a:t>Dane:</a:t>
             </a:r>
           </a:p>
           <a:p>
             <a:pPr lvl="1"/>
             <a:r>
-              <a:rPr lang="pl-PL" dirty="0"/>
+              <a:rPr lang="pl-PL" sz="3200" dirty="0"/>
               <a:t>Dwie liczby naturalne większe od zera</a:t>
             </a:r>
           </a:p>
@@ -5566,15 +6987,21 @@
             <a:pPr marL="0" indent="0">
               <a:buNone/>
             </a:pPr>
-            <a:r>
-              <a:rPr lang="pl-PL" sz="2400" b="1" dirty="0"/>
+            <a:endParaRPr lang="pl-PL" sz="3200" b="1" dirty="0"/>
+          </a:p>
+          <a:p>
+            <a:pPr marL="0" indent="0">
+              <a:buNone/>
+            </a:pPr>
+            <a:r>
+              <a:rPr lang="pl-PL" sz="3200" b="1" dirty="0"/>
               <a:t>Wynik:</a:t>
             </a:r>
           </a:p>
           <a:p>
             <a:pPr lvl="1"/>
             <a:r>
-              <a:rPr lang="pl-PL" dirty="0"/>
+              <a:rPr lang="pl-PL" sz="3200" dirty="0"/>
               <a:t>Największy wspólny dzielnik podanych liczb</a:t>
             </a:r>
           </a:p>
@@ -5583,20 +7010,13 @@
     </p:spTree>
     <p:extLst>
       <p:ext uri="{BB962C8B-B14F-4D97-AF65-F5344CB8AC3E}">
-        <p14:creationId xmlns:p14="http://schemas.microsoft.com/office/powerpoint/2010/main" xmlns="" val="1148371762"/>
+        <p14:creationId xmlns:p14="http://schemas.microsoft.com/office/powerpoint/2010/main" val="1148371762"/>
       </p:ext>
     </p:extLst>
   </p:cSld>
   <p:clrMapOvr>
     <a:masterClrMapping/>
   </p:clrMapOvr>
-  <p:timing>
-    <p:tnLst>
-      <p:par>
-        <p:cTn id="1" dur="indefinite" restart="never" nodeType="tmRoot"/>
-      </p:par>
-    </p:tnLst>
-  </p:timing>
 </p:sld>
 </file>
 
@@ -5622,7 +7042,7 @@
           <p:cNvPr id="2" name="Tytuł 1">
             <a:extLst>
               <a:ext uri="{FF2B5EF4-FFF2-40B4-BE49-F238E27FC236}">
-                <a16:creationId xmlns:a16="http://schemas.microsoft.com/office/drawing/2014/main" xmlns="" id="{BB8CEA7B-F5E6-F94A-8D72-20CCCF4E90AA}"/>
+                <a16:creationId xmlns:a16="http://schemas.microsoft.com/office/drawing/2014/main" id="{BB8CEA7B-F5E6-F94A-8D72-20CCCF4E90AA}"/>
               </a:ext>
             </a:extLst>
           </p:cNvPr>
@@ -5645,8 +7065,8 @@
           </a:p>
         </p:txBody>
       </p:sp>
-      <mc:AlternateContent xmlns:mc="http://schemas.openxmlformats.org/markup-compatibility/2006">
-        <mc:Choice xmlns:a14="http://schemas.microsoft.com/office/drawing/2010/main" xmlns="" Requires="a14">
+      <mc:AlternateContent xmlns:mc="http://schemas.openxmlformats.org/markup-compatibility/2006" xmlns:a14="http://schemas.microsoft.com/office/drawing/2010/main">
+        <mc:Choice Requires="a14">
           <p:sp>
             <p:nvSpPr>
               <p:cNvPr id="3" name="Symbol zastępczy zawartości 2">
@@ -5858,7 +7278,7 @@
             </p:txBody>
           </p:sp>
         </mc:Choice>
-        <mc:Fallback>
+        <mc:Fallback xmlns="">
           <p:sp>
             <p:nvSpPr>
               <p:cNvPr id="3" name="Symbol zastępczy zawartości 2">
@@ -5901,20 +7321,13 @@
     </p:spTree>
     <p:extLst>
       <p:ext uri="{BB962C8B-B14F-4D97-AF65-F5344CB8AC3E}">
-        <p14:creationId xmlns:p14="http://schemas.microsoft.com/office/powerpoint/2010/main" xmlns="" val="3470768558"/>
+        <p14:creationId xmlns:p14="http://schemas.microsoft.com/office/powerpoint/2010/main" val="3470768558"/>
       </p:ext>
     </p:extLst>
   </p:cSld>
   <p:clrMapOvr>
     <a:masterClrMapping/>
   </p:clrMapOvr>
-  <p:timing>
-    <p:tnLst>
-      <p:par>
-        <p:cTn id="1" dur="indefinite" restart="never" nodeType="tmRoot"/>
-      </p:par>
-    </p:tnLst>
-  </p:timing>
 </p:sld>
 </file>
 
@@ -6207,7 +7620,7 @@
   <a:extraClrSchemeLst/>
   <a:extLst>
     <a:ext uri="{05A4C25C-085E-4340-85A3-A5531E510DB2}">
-      <thm15:themeFamily xmlns:thm15="http://schemas.microsoft.com/office/thememl/2012/main" xmlns="" name="Office Theme" id="{62F939B6-93AF-4DB8-9C6B-D6C7DFDC589F}" vid="{4A3C46E8-61CC-4603-A589-7422A47A8E4A}"/>
+      <thm15:themeFamily xmlns:thm15="http://schemas.microsoft.com/office/thememl/2012/main" name="Office Theme" id="{62F939B6-93AF-4DB8-9C6B-D6C7DFDC589F}" vid="{4A3C46E8-61CC-4603-A589-7422A47A8E4A}"/>
     </a:ext>
   </a:extLst>
 </a:theme>

</xml_diff>